<commit_message>
include `kubectl explain` command
</commit_message>
<xml_diff>
--- a/kubernetes/02_pods.pptx
+++ b/kubernetes/02_pods.pptx
@@ -5,10 +5,10 @@
     <p:sldMasterId id="2147483733" r:id="rId1"/>
   </p:sldMasterIdLst>
   <p:notesMasterIdLst>
-    <p:notesMasterId r:id="rId13"/>
+    <p:notesMasterId r:id="rId15"/>
   </p:notesMasterIdLst>
   <p:handoutMasterIdLst>
-    <p:handoutMasterId r:id="rId14"/>
+    <p:handoutMasterId r:id="rId16"/>
   </p:handoutMasterIdLst>
   <p:sldIdLst>
     <p:sldId id="433" r:id="rId2"/>
@@ -17,11 +17,13 @@
     <p:sldId id="441" r:id="rId5"/>
     <p:sldId id="447" r:id="rId6"/>
     <p:sldId id="445" r:id="rId7"/>
-    <p:sldId id="438" r:id="rId8"/>
-    <p:sldId id="446" r:id="rId9"/>
-    <p:sldId id="443" r:id="rId10"/>
-    <p:sldId id="444" r:id="rId11"/>
-    <p:sldId id="265" r:id="rId12"/>
+    <p:sldId id="450" r:id="rId8"/>
+    <p:sldId id="451" r:id="rId9"/>
+    <p:sldId id="438" r:id="rId10"/>
+    <p:sldId id="446" r:id="rId11"/>
+    <p:sldId id="443" r:id="rId12"/>
+    <p:sldId id="444" r:id="rId13"/>
+    <p:sldId id="265" r:id="rId14"/>
   </p:sldIdLst>
   <p:sldSz cx="12195175" cy="6858000"/>
   <p:notesSz cx="6858000" cy="9144000"/>
@@ -654,7 +656,101 @@
           <a:bodyPr/>
           <a:lstStyle/>
           <a:p>
-            <a:endParaRPr lang="en-US"/>
+            <a:r>
+              <a:rPr lang="en-US" dirty="0"/>
+              <a:t>Demo: http &amp; exec</a:t>
+            </a:r>
+            <a:r>
+              <a:rPr lang="en-US" baseline="0" dirty="0"/>
+              <a:t> liveness pods (see </a:t>
+            </a:r>
+            <a:r>
+              <a:rPr lang="en-US" baseline="0" dirty="0" err="1"/>
+              <a:t>pod_exec_liveness</a:t>
+            </a:r>
+            <a:r>
+              <a:rPr lang="en-US" baseline="0" dirty="0"/>
+              <a:t> &amp; </a:t>
+            </a:r>
+            <a:r>
+              <a:rPr lang="en-US" baseline="0" dirty="0" err="1"/>
+              <a:t>pod_http_liveness</a:t>
+            </a:r>
+            <a:r>
+              <a:rPr lang="en-US" baseline="0" dirty="0"/>
+              <a:t> </a:t>
+            </a:r>
+            <a:r>
+              <a:rPr lang="en-US" baseline="0" dirty="0" err="1"/>
+              <a:t>yaml</a:t>
+            </a:r>
+            <a:r>
+              <a:rPr lang="en-US" baseline="0" dirty="0"/>
+              <a:t> files in the solutions folder)</a:t>
+            </a:r>
+            <a:endParaRPr lang="en-US" dirty="0"/>
+          </a:p>
+          <a:p>
+            <a:r>
+              <a:rPr lang="en-US" dirty="0"/>
+              <a:t>Consequence of failed probe:</a:t>
+            </a:r>
+          </a:p>
+          <a:p>
+            <a:pPr marL="285750" indent="-285750">
+              <a:buFontTx/>
+              <a:buChar char="-"/>
+            </a:pPr>
+            <a:r>
+              <a:rPr lang="en-US" dirty="0"/>
+              <a:t>liveness: kill the container and restart it depending on the restart policy.</a:t>
+            </a:r>
+          </a:p>
+          <a:p>
+            <a:pPr marL="285750" indent="-285750">
+              <a:buFontTx/>
+              <a:buChar char="-"/>
+            </a:pPr>
+            <a:r>
+              <a:rPr lang="en-US" dirty="0"/>
+              <a:t>Readiness: mark pod</a:t>
+            </a:r>
+            <a:r>
+              <a:rPr lang="en-US" baseline="0" dirty="0"/>
+              <a:t> as not ready and don’t route service traffic to it</a:t>
+            </a:r>
+            <a:endParaRPr lang="en-US" dirty="0"/>
+          </a:p>
+          <a:p>
+            <a:r>
+              <a:rPr lang="en-US" dirty="0"/>
+              <a:t>Other options</a:t>
+            </a:r>
+            <a:r>
+              <a:rPr lang="en-US" baseline="0" dirty="0"/>
+              <a:t> for probes: </a:t>
+            </a:r>
+          </a:p>
+          <a:p>
+            <a:pPr marL="285750" indent="-285750">
+              <a:buFontTx/>
+              <a:buChar char="-"/>
+            </a:pPr>
+            <a:r>
+              <a:rPr lang="en-US" baseline="0" dirty="0"/>
+              <a:t>TCP: can a connection be opened successfully?</a:t>
+            </a:r>
+          </a:p>
+          <a:p>
+            <a:pPr marL="285750" indent="-285750">
+              <a:buFontTx/>
+              <a:buChar char="-"/>
+            </a:pPr>
+            <a:r>
+              <a:rPr lang="en-US" baseline="0" dirty="0"/>
+              <a:t>EXEC: run a command and evaluate return/exit code</a:t>
+            </a:r>
+            <a:endParaRPr lang="en-US" dirty="0"/>
           </a:p>
         </p:txBody>
       </p:sp>
@@ -685,6 +781,390 @@
     </p:spTree>
     <p:extLst>
       <p:ext uri="{BB962C8B-B14F-4D97-AF65-F5344CB8AC3E}">
+        <p14:creationId xmlns:p14="http://schemas.microsoft.com/office/powerpoint/2010/main" val="3950672114"/>
+      </p:ext>
+    </p:extLst>
+  </p:cSld>
+  <p:clrMapOvr>
+    <a:masterClrMapping/>
+  </p:clrMapOvr>
+</p:notes>
+</file>
+
+<file path=ppt/notesSlides/notesSlide11.xml><?xml version="1.0" encoding="utf-8"?>
+<p:notes xmlns:a="http://schemas.openxmlformats.org/drawingml/2006/main" xmlns:r="http://schemas.openxmlformats.org/officeDocument/2006/relationships" xmlns:p="http://schemas.openxmlformats.org/presentationml/2006/main">
+  <p:cSld>
+    <p:spTree>
+      <p:nvGrpSpPr>
+        <p:cNvPr id="1" name=""/>
+        <p:cNvGrpSpPr/>
+        <p:nvPr/>
+      </p:nvGrpSpPr>
+      <p:grpSpPr>
+        <a:xfrm>
+          <a:off x="0" y="0"/>
+          <a:ext cx="0" cy="0"/>
+          <a:chOff x="0" y="0"/>
+          <a:chExt cx="0" cy="0"/>
+        </a:xfrm>
+      </p:grpSpPr>
+      <p:sp>
+        <p:nvSpPr>
+          <p:cNvPr id="2" name="Slide Image Placeholder 1"/>
+          <p:cNvSpPr>
+            <a:spLocks noGrp="1" noRot="1" noChangeAspect="1"/>
+          </p:cNvSpPr>
+          <p:nvPr>
+            <p:ph type="sldImg"/>
+          </p:nvPr>
+        </p:nvSpPr>
+        <p:spPr/>
+      </p:sp>
+      <p:sp>
+        <p:nvSpPr>
+          <p:cNvPr id="3" name="Notes Placeholder 2"/>
+          <p:cNvSpPr>
+            <a:spLocks noGrp="1"/>
+          </p:cNvSpPr>
+          <p:nvPr>
+            <p:ph type="body" idx="1"/>
+          </p:nvPr>
+        </p:nvSpPr>
+        <p:spPr/>
+        <p:txBody>
+          <a:bodyPr/>
+          <a:lstStyle/>
+          <a:p>
+            <a:pPr marL="342900" indent="-342900">
+              <a:buFontTx/>
+              <a:buChar char="-"/>
+            </a:pPr>
+            <a:r>
+              <a:rPr lang="en-US" dirty="0"/>
+              <a:t>Start with the “</a:t>
+            </a:r>
+            <a:r>
+              <a:rPr lang="en-US" dirty="0" err="1"/>
+              <a:t>kubectl</a:t>
+            </a:r>
+            <a:r>
+              <a:rPr lang="en-US" dirty="0"/>
+              <a:t> explain pod” and “</a:t>
+            </a:r>
+            <a:r>
+              <a:rPr lang="en-US" dirty="0" err="1"/>
+              <a:t>kubectl</a:t>
+            </a:r>
+            <a:r>
+              <a:rPr lang="en-US" dirty="0"/>
+              <a:t> explain </a:t>
+            </a:r>
+            <a:r>
+              <a:rPr lang="en-US" dirty="0" err="1"/>
+              <a:t>pod.spec</a:t>
+            </a:r>
+            <a:r>
+              <a:rPr lang="en-US" dirty="0"/>
+              <a:t>”</a:t>
+            </a:r>
+          </a:p>
+          <a:p>
+            <a:pPr marL="342900" indent="-342900">
+              <a:buFontTx/>
+              <a:buChar char="-"/>
+            </a:pPr>
+            <a:r>
+              <a:rPr lang="en-US" dirty="0"/>
+              <a:t>Show how to get an overview as well as detailed info about a resource type.</a:t>
+            </a:r>
+          </a:p>
+          <a:p>
+            <a:pPr marL="342900" indent="-342900">
+              <a:buFontTx/>
+              <a:buChar char="-"/>
+            </a:pPr>
+            <a:r>
+              <a:rPr lang="en-US" dirty="0"/>
+              <a:t>Create a pod: ~/</a:t>
+            </a:r>
+            <a:r>
+              <a:rPr lang="en-US" dirty="0" err="1"/>
+              <a:t>kubernetes</a:t>
+            </a:r>
+            <a:r>
+              <a:rPr lang="en-US" dirty="0"/>
+              <a:t>/demo/02_pod_exec_liveness.yaml</a:t>
+            </a:r>
+          </a:p>
+          <a:p>
+            <a:pPr marL="522900" lvl="1" indent="-342900">
+              <a:buFontTx/>
+              <a:buChar char="-"/>
+            </a:pPr>
+            <a:r>
+              <a:rPr lang="en-US" dirty="0"/>
+              <a:t>Discuss the probe and how it should fail</a:t>
+            </a:r>
+          </a:p>
+          <a:p>
+            <a:pPr marL="522900" lvl="1" indent="-342900">
+              <a:buFontTx/>
+              <a:buChar char="-"/>
+            </a:pPr>
+            <a:r>
+              <a:rPr lang="en-US" dirty="0"/>
+              <a:t>Show how it fails &amp; get restarted</a:t>
+            </a:r>
+          </a:p>
+          <a:p>
+            <a:pPr marL="522900" lvl="1" indent="-342900">
+              <a:buFontTx/>
+              <a:buChar char="-"/>
+            </a:pPr>
+            <a:r>
+              <a:rPr lang="en-US" dirty="0"/>
+              <a:t>Point out the failure threshold</a:t>
+            </a:r>
+          </a:p>
+          <a:p>
+            <a:pPr marL="342900" indent="-342900">
+              <a:buFontTx/>
+              <a:buChar char="-"/>
+            </a:pPr>
+            <a:r>
+              <a:rPr lang="en-US" dirty="0"/>
+              <a:t>Create a 2</a:t>
+            </a:r>
+            <a:r>
+              <a:rPr lang="en-US" baseline="30000" dirty="0"/>
+              <a:t>nd</a:t>
+            </a:r>
+            <a:r>
+              <a:rPr lang="en-US" dirty="0"/>
+              <a:t> pod, this time with a web server: ~/</a:t>
+            </a:r>
+            <a:r>
+              <a:rPr lang="en-US" dirty="0" err="1"/>
+              <a:t>kubernetes</a:t>
+            </a:r>
+            <a:r>
+              <a:rPr lang="en-US" dirty="0"/>
+              <a:t>/demo/02_pod_http_liveness.yaml</a:t>
+            </a:r>
+          </a:p>
+          <a:p>
+            <a:pPr marL="522900" lvl="1" indent="-342900">
+              <a:buFontTx/>
+              <a:buChar char="-"/>
+            </a:pPr>
+            <a:r>
+              <a:rPr lang="en-US" dirty="0"/>
+              <a:t>Explain the http probe and how it should fill up the logs</a:t>
+            </a:r>
+          </a:p>
+          <a:p>
+            <a:pPr marL="522900" marR="0" lvl="1" indent="-342900" algn="l" defTabSz="1088776" rtl="0" eaLnBrk="1" fontAlgn="auto" latinLnBrk="0" hangingPunct="1">
+              <a:lnSpc>
+                <a:spcPct val="100000"/>
+              </a:lnSpc>
+              <a:spcBef>
+                <a:spcPts val="0"/>
+              </a:spcBef>
+              <a:spcAft>
+                <a:spcPts val="0"/>
+              </a:spcAft>
+              <a:buClr>
+                <a:schemeClr val="accent1"/>
+              </a:buClr>
+              <a:buSzPct val="100000"/>
+              <a:buFontTx/>
+              <a:buChar char="-"/>
+              <a:tabLst/>
+              <a:defRPr/>
+            </a:pPr>
+            <a:r>
+              <a:rPr lang="en-US" dirty="0"/>
+              <a:t>Show logs of the container (will be the access log) and discuss the effect of the liveness probe</a:t>
+            </a:r>
+          </a:p>
+          <a:p>
+            <a:pPr marL="342900" indent="-342900">
+              <a:buFontTx/>
+              <a:buChar char="-"/>
+            </a:pPr>
+            <a:r>
+              <a:rPr lang="en-US" dirty="0"/>
+              <a:t>Access </a:t>
+            </a:r>
+            <a:r>
+              <a:rPr lang="en-US" dirty="0" err="1"/>
+              <a:t>nginx</a:t>
+            </a:r>
+            <a:r>
+              <a:rPr lang="en-US" dirty="0"/>
+              <a:t>:</a:t>
+            </a:r>
+          </a:p>
+          <a:p>
+            <a:pPr marL="522864" lvl="1" indent="-342900">
+              <a:buFontTx/>
+              <a:buChar char="-"/>
+            </a:pPr>
+            <a:r>
+              <a:rPr lang="en-US" dirty="0"/>
+              <a:t>Run  </a:t>
+            </a:r>
+            <a:r>
+              <a:rPr lang="en-US" dirty="0" err="1"/>
+              <a:t>kubectl</a:t>
+            </a:r>
+            <a:r>
+              <a:rPr lang="en-US" dirty="0"/>
+              <a:t> port-forward pod/</a:t>
+            </a:r>
+            <a:r>
+              <a:rPr lang="en-US" dirty="0" err="1"/>
+              <a:t>nginx</a:t>
+            </a:r>
+            <a:r>
+              <a:rPr lang="en-US" dirty="0"/>
+              <a:t>-liveness-pod 8080:80</a:t>
+            </a:r>
+          </a:p>
+          <a:p>
+            <a:pPr marL="522864" lvl="1" indent="-342900">
+              <a:buFontTx/>
+              <a:buChar char="-"/>
+            </a:pPr>
+            <a:r>
+              <a:rPr lang="en-US" dirty="0"/>
+              <a:t>Open a browser and connect to 127.0.0.1:8080</a:t>
+            </a:r>
+          </a:p>
+          <a:p>
+            <a:pPr marL="522864" lvl="1" indent="-342900">
+              <a:buFontTx/>
+              <a:buChar char="-"/>
+            </a:pPr>
+            <a:r>
+              <a:rPr lang="en-US" dirty="0"/>
+              <a:t>Port-forward is a nice command to test access to something that you don’t want to expose (yet). However it is not recommended for any production like setup as the traffic is routed via the cluster’s API server</a:t>
+            </a:r>
+          </a:p>
+        </p:txBody>
+      </p:sp>
+      <p:sp>
+        <p:nvSpPr>
+          <p:cNvPr id="4" name="Slide Number Placeholder 3"/>
+          <p:cNvSpPr>
+            <a:spLocks noGrp="1"/>
+          </p:cNvSpPr>
+          <p:nvPr>
+            <p:ph type="sldNum" sz="quarter" idx="10"/>
+          </p:nvPr>
+        </p:nvSpPr>
+        <p:spPr/>
+        <p:txBody>
+          <a:bodyPr/>
+          <a:lstStyle/>
+          <a:p>
+            <a:fld id="{7D8C2C35-2B8A-446E-BEC0-FD36716C29AC}" type="slidenum">
+              <a:rPr lang="de-DE" smtClean="0"/>
+              <a:pPr/>
+              <a:t>11</a:t>
+            </a:fld>
+            <a:endParaRPr lang="de-DE" dirty="0"/>
+          </a:p>
+        </p:txBody>
+      </p:sp>
+    </p:spTree>
+    <p:extLst>
+      <p:ext uri="{BB962C8B-B14F-4D97-AF65-F5344CB8AC3E}">
+        <p14:creationId xmlns:p14="http://schemas.microsoft.com/office/powerpoint/2010/main" val="2327213927"/>
+      </p:ext>
+    </p:extLst>
+  </p:cSld>
+  <p:clrMapOvr>
+    <a:masterClrMapping/>
+  </p:clrMapOvr>
+</p:notes>
+</file>
+
+<file path=ppt/notesSlides/notesSlide12.xml><?xml version="1.0" encoding="utf-8"?>
+<p:notes xmlns:a="http://schemas.openxmlformats.org/drawingml/2006/main" xmlns:r="http://schemas.openxmlformats.org/officeDocument/2006/relationships" xmlns:p="http://schemas.openxmlformats.org/presentationml/2006/main">
+  <p:cSld>
+    <p:spTree>
+      <p:nvGrpSpPr>
+        <p:cNvPr id="1" name=""/>
+        <p:cNvGrpSpPr/>
+        <p:nvPr/>
+      </p:nvGrpSpPr>
+      <p:grpSpPr>
+        <a:xfrm>
+          <a:off x="0" y="0"/>
+          <a:ext cx="0" cy="0"/>
+          <a:chOff x="0" y="0"/>
+          <a:chExt cx="0" cy="0"/>
+        </a:xfrm>
+      </p:grpSpPr>
+      <p:sp>
+        <p:nvSpPr>
+          <p:cNvPr id="2" name="Slide Image Placeholder 1"/>
+          <p:cNvSpPr>
+            <a:spLocks noGrp="1" noRot="1" noChangeAspect="1"/>
+          </p:cNvSpPr>
+          <p:nvPr>
+            <p:ph type="sldImg"/>
+          </p:nvPr>
+        </p:nvSpPr>
+        <p:spPr/>
+      </p:sp>
+      <p:sp>
+        <p:nvSpPr>
+          <p:cNvPr id="3" name="Notes Placeholder 2"/>
+          <p:cNvSpPr>
+            <a:spLocks noGrp="1"/>
+          </p:cNvSpPr>
+          <p:nvPr>
+            <p:ph type="body" idx="1"/>
+          </p:nvPr>
+        </p:nvSpPr>
+        <p:spPr/>
+        <p:txBody>
+          <a:bodyPr/>
+          <a:lstStyle/>
+          <a:p>
+            <a:endParaRPr lang="en-US"/>
+          </a:p>
+        </p:txBody>
+      </p:sp>
+      <p:sp>
+        <p:nvSpPr>
+          <p:cNvPr id="4" name="Slide Number Placeholder 3"/>
+          <p:cNvSpPr>
+            <a:spLocks noGrp="1"/>
+          </p:cNvSpPr>
+          <p:nvPr>
+            <p:ph type="sldNum" sz="quarter" idx="10"/>
+          </p:nvPr>
+        </p:nvSpPr>
+        <p:spPr/>
+        <p:txBody>
+          <a:bodyPr/>
+          <a:lstStyle/>
+          <a:p>
+            <a:fld id="{7D8C2C35-2B8A-446E-BEC0-FD36716C29AC}" type="slidenum">
+              <a:rPr lang="de-DE" smtClean="0"/>
+              <a:pPr/>
+              <a:t>12</a:t>
+            </a:fld>
+            <a:endParaRPr lang="de-DE" dirty="0"/>
+          </a:p>
+        </p:txBody>
+      </p:sp>
+    </p:spTree>
+    <p:extLst>
+      <p:ext uri="{BB962C8B-B14F-4D97-AF65-F5344CB8AC3E}">
         <p14:creationId xmlns:p14="http://schemas.microsoft.com/office/powerpoint/2010/main" val="2480745755"/>
       </p:ext>
     </p:extLst>
@@ -695,7 +1175,7 @@
 </p:notes>
 </file>
 
-<file path=ppt/notesSlides/notesSlide11.xml><?xml version="1.0" encoding="utf-8"?>
+<file path=ppt/notesSlides/notesSlide13.xml><?xml version="1.0" encoding="utf-8"?>
 <p:notes xmlns:a="http://schemas.openxmlformats.org/drawingml/2006/main" xmlns:r="http://schemas.openxmlformats.org/officeDocument/2006/relationships" xmlns:p="http://schemas.openxmlformats.org/presentationml/2006/main">
   <p:cSld>
     <p:spTree>
@@ -730,7 +1210,7 @@
             <a:fld id="{7D8C2C35-2B8A-446E-BEC0-FD36716C29AC}" type="slidenum">
               <a:rPr lang="de-DE" smtClean="0"/>
               <a:pPr/>
-              <a:t>11</a:t>
+              <a:t>13</a:t>
             </a:fld>
             <a:endParaRPr lang="de-DE" dirty="0"/>
           </a:p>
@@ -1521,6 +2001,59 @@
       </p:grpSpPr>
       <p:sp>
         <p:nvSpPr>
+          <p:cNvPr id="2" name="Slide Image Placeholder 1"/>
+          <p:cNvSpPr>
+            <a:spLocks noGrp="1" noRot="1" noChangeAspect="1"/>
+          </p:cNvSpPr>
+          <p:nvPr>
+            <p:ph type="sldImg"/>
+          </p:nvPr>
+        </p:nvSpPr>
+        <p:spPr/>
+      </p:sp>
+      <p:sp>
+        <p:nvSpPr>
+          <p:cNvPr id="3" name="Notes Placeholder 2"/>
+          <p:cNvSpPr>
+            <a:spLocks noGrp="1"/>
+          </p:cNvSpPr>
+          <p:nvPr>
+            <p:ph type="body" idx="1"/>
+          </p:nvPr>
+        </p:nvSpPr>
+        <p:spPr/>
+        <p:txBody>
+          <a:bodyPr/>
+          <a:lstStyle/>
+          <a:p>
+            <a:r>
+              <a:rPr lang="en-US" dirty="0"/>
+              <a:t>If you want to know more about the structure of any </a:t>
+            </a:r>
+            <a:r>
+              <a:rPr lang="en-US" dirty="0" err="1"/>
+              <a:t>kubernetes</a:t>
+            </a:r>
+            <a:r>
+              <a:rPr lang="en-US" dirty="0"/>
+              <a:t> resource, you can go to the official API documentation on https://kubernetes.io/docs/reference/#api-reference or use “</a:t>
+            </a:r>
+            <a:r>
+              <a:rPr lang="en-US" dirty="0" err="1"/>
+              <a:t>kubectl</a:t>
+            </a:r>
+            <a:r>
+              <a:rPr lang="en-US" dirty="0"/>
+              <a:t> explain &lt;resource&gt;” command.</a:t>
+            </a:r>
+          </a:p>
+          <a:p>
+            <a:endParaRPr lang="en-US" dirty="0"/>
+          </a:p>
+        </p:txBody>
+      </p:sp>
+      <p:sp>
+        <p:nvSpPr>
           <p:cNvPr id="4" name="Slide Number Placeholder 3"/>
           <p:cNvSpPr>
             <a:spLocks noGrp="1"/>
@@ -1543,48 +2076,10 @@
           </a:p>
         </p:txBody>
       </p:sp>
-      <p:sp>
-        <p:nvSpPr>
-          <p:cNvPr id="9" name="Slide Image Placeholder 8"/>
-          <p:cNvSpPr>
-            <a:spLocks noGrp="1" noRot="1" noChangeAspect="1"/>
-          </p:cNvSpPr>
-          <p:nvPr>
-            <p:ph type="sldImg"/>
-          </p:nvPr>
-        </p:nvSpPr>
-        <p:spPr>
-          <a:xfrm>
-            <a:off x="547688" y="612775"/>
-            <a:ext cx="5762625" cy="3241675"/>
-          </a:xfrm>
-        </p:spPr>
-      </p:sp>
-      <p:sp>
-        <p:nvSpPr>
-          <p:cNvPr id="10" name="Notes Placeholder 9"/>
-          <p:cNvSpPr>
-            <a:spLocks noGrp="1"/>
-          </p:cNvSpPr>
-          <p:nvPr>
-            <p:ph type="body" idx="1"/>
-          </p:nvPr>
-        </p:nvSpPr>
-        <p:spPr/>
-        <p:txBody>
-          <a:bodyPr>
-            <a:normAutofit/>
-          </a:bodyPr>
-          <a:lstStyle/>
-          <a:p>
-            <a:endParaRPr lang="en-US" dirty="0"/>
-          </a:p>
-        </p:txBody>
-      </p:sp>
     </p:spTree>
     <p:extLst>
       <p:ext uri="{BB962C8B-B14F-4D97-AF65-F5344CB8AC3E}">
-        <p14:creationId xmlns:p14="http://schemas.microsoft.com/office/powerpoint/2010/main" val="3968705523"/>
+        <p14:creationId xmlns:p14="http://schemas.microsoft.com/office/powerpoint/2010/main" val="1276059447"/>
       </p:ext>
     </p:extLst>
   </p:cSld>
@@ -1639,100 +2134,48 @@
           <a:lstStyle/>
           <a:p>
             <a:r>
-              <a:rPr lang="en-US" dirty="0"/>
-              <a:t>Demo: http &amp; exec</a:t>
-            </a:r>
-            <a:r>
-              <a:rPr lang="en-US" baseline="0" dirty="0"/>
-              <a:t> liveness pods (see </a:t>
-            </a:r>
-            <a:r>
-              <a:rPr lang="en-US" baseline="0" dirty="0" err="1"/>
-              <a:t>pod_exec_liveness</a:t>
-            </a:r>
-            <a:r>
-              <a:rPr lang="en-US" baseline="0" dirty="0"/>
-              <a:t> &amp; </a:t>
-            </a:r>
-            <a:r>
-              <a:rPr lang="en-US" baseline="0" dirty="0" err="1"/>
-              <a:t>pod_http_liveness</a:t>
-            </a:r>
-            <a:r>
-              <a:rPr lang="en-US" baseline="0" dirty="0"/>
-              <a:t> </a:t>
-            </a:r>
-            <a:r>
-              <a:rPr lang="en-US" baseline="0" dirty="0" err="1"/>
-              <a:t>yaml</a:t>
-            </a:r>
-            <a:r>
-              <a:rPr lang="en-US" baseline="0" dirty="0"/>
-              <a:t> files in the solutions folder)</a:t>
-            </a:r>
+              <a:rPr lang="en-US" dirty="0" err="1"/>
+              <a:t>kubectl</a:t>
+            </a:r>
+            <a:r>
+              <a:rPr lang="en-US" dirty="0"/>
+              <a:t> explain &lt;resource&gt; is the command line access to the </a:t>
+            </a:r>
+            <a:r>
+              <a:rPr lang="en-US" dirty="0" err="1"/>
+              <a:t>api</a:t>
+            </a:r>
+            <a:r>
+              <a:rPr lang="en-US" dirty="0"/>
+              <a:t> documentation. It gives the same information as the online documentation. </a:t>
+            </a:r>
+          </a:p>
+          <a:p>
             <a:endParaRPr lang="en-US" dirty="0"/>
           </a:p>
           <a:p>
             <a:r>
               <a:rPr lang="en-US" dirty="0"/>
-              <a:t>Consequence of failed probe:</a:t>
-            </a:r>
-          </a:p>
-          <a:p>
-            <a:pPr marL="285750" indent="-285750">
-              <a:buFontTx/>
-              <a:buChar char="-"/>
-            </a:pPr>
-            <a:r>
-              <a:rPr lang="en-US" dirty="0"/>
-              <a:t>liveness: kill the container and restart it depending on the restart policy.</a:t>
-            </a:r>
-          </a:p>
-          <a:p>
-            <a:pPr marL="285750" indent="-285750">
-              <a:buFontTx/>
-              <a:buChar char="-"/>
-            </a:pPr>
-            <a:r>
-              <a:rPr lang="en-US" dirty="0"/>
-              <a:t>Readiness: mark pod</a:t>
-            </a:r>
-            <a:r>
-              <a:rPr lang="en-US" baseline="0" dirty="0"/>
-              <a:t> as not ready and don’t route service traffic to it</a:t>
-            </a:r>
-            <a:endParaRPr lang="en-US" dirty="0"/>
-          </a:p>
-          <a:p>
-            <a:r>
-              <a:rPr lang="en-US" dirty="0"/>
-              <a:t>Other options</a:t>
-            </a:r>
-            <a:r>
-              <a:rPr lang="en-US" baseline="0" dirty="0"/>
-              <a:t> for probes: </a:t>
-            </a:r>
-          </a:p>
-          <a:p>
-            <a:pPr marL="285750" indent="-285750">
-              <a:buFontTx/>
-              <a:buChar char="-"/>
-            </a:pPr>
-            <a:r>
-              <a:rPr lang="en-US" baseline="0" dirty="0"/>
-              <a:t>TCP: can a connection be opened successfully?</a:t>
-            </a:r>
-          </a:p>
-          <a:p>
-            <a:pPr marL="285750" indent="-285750">
-              <a:buFontTx/>
-              <a:buChar char="-"/>
-            </a:pPr>
-            <a:r>
-              <a:rPr lang="en-US" baseline="0" dirty="0"/>
-              <a:t>EXEC: run a command and evaluate return/exit code</a:t>
-            </a:r>
-            <a:endParaRPr lang="en-US" dirty="0"/>
+              <a:t>You can get more details on specific objects or fields by appending them with .&lt;field&gt; </a:t>
+            </a:r>
+            <a:r>
+              <a:rPr lang="en-US" dirty="0">
+                <a:sym typeface="Wingdings" panose="05000000000000000000" pitchFamily="2" charset="2"/>
+              </a:rPr>
+              <a:t> e.g. </a:t>
+            </a:r>
+            <a:r>
+              <a:rPr lang="en-US" dirty="0"/>
+              <a:t>“.spec” or “.</a:t>
+            </a:r>
+            <a:r>
+              <a:rPr lang="en-US" dirty="0" err="1"/>
+              <a:t>apiVersion</a:t>
+            </a:r>
+            <a:r>
+              <a:rPr lang="en-US" dirty="0"/>
+              <a:t>” </a:t>
+            </a:r>
           </a:p>
         </p:txBody>
       </p:sp>
@@ -1763,7 +2206,7 @@
     </p:spTree>
     <p:extLst>
       <p:ext uri="{BB962C8B-B14F-4D97-AF65-F5344CB8AC3E}">
-        <p14:creationId xmlns:p14="http://schemas.microsoft.com/office/powerpoint/2010/main" val="3950672114"/>
+        <p14:creationId xmlns:p14="http://schemas.microsoft.com/office/powerpoint/2010/main" val="624260277"/>
       </p:ext>
     </p:extLst>
   </p:cSld>
@@ -1792,207 +2235,6 @@
       </p:grpSpPr>
       <p:sp>
         <p:nvSpPr>
-          <p:cNvPr id="2" name="Slide Image Placeholder 1"/>
-          <p:cNvSpPr>
-            <a:spLocks noGrp="1" noRot="1" noChangeAspect="1"/>
-          </p:cNvSpPr>
-          <p:nvPr>
-            <p:ph type="sldImg"/>
-          </p:nvPr>
-        </p:nvSpPr>
-        <p:spPr/>
-      </p:sp>
-      <p:sp>
-        <p:nvSpPr>
-          <p:cNvPr id="3" name="Notes Placeholder 2"/>
-          <p:cNvSpPr>
-            <a:spLocks noGrp="1"/>
-          </p:cNvSpPr>
-          <p:nvPr>
-            <p:ph type="body" idx="1"/>
-          </p:nvPr>
-        </p:nvSpPr>
-        <p:spPr/>
-        <p:txBody>
-          <a:bodyPr/>
-          <a:lstStyle/>
-          <a:p>
-            <a:pPr marL="342900" indent="-342900">
-              <a:buFontTx/>
-              <a:buChar char="-"/>
-            </a:pPr>
-            <a:r>
-              <a:rPr lang="en-US" dirty="0"/>
-              <a:t>Create a pod: ~/</a:t>
-            </a:r>
-            <a:r>
-              <a:rPr lang="en-US" dirty="0" err="1"/>
-              <a:t>kubernetes</a:t>
-            </a:r>
-            <a:r>
-              <a:rPr lang="en-US" dirty="0"/>
-              <a:t>/demo/02_pod_exec_liveness.yaml</a:t>
-            </a:r>
-          </a:p>
-          <a:p>
-            <a:pPr marL="522900" lvl="1" indent="-342900">
-              <a:buFontTx/>
-              <a:buChar char="-"/>
-            </a:pPr>
-            <a:r>
-              <a:rPr lang="en-US" dirty="0"/>
-              <a:t>Discuss the probe and how it should fail</a:t>
-            </a:r>
-          </a:p>
-          <a:p>
-            <a:pPr marL="522900" lvl="1" indent="-342900">
-              <a:buFontTx/>
-              <a:buChar char="-"/>
-            </a:pPr>
-            <a:r>
-              <a:rPr lang="en-US" dirty="0"/>
-              <a:t>Show how it fails &amp; get restarted</a:t>
-            </a:r>
-          </a:p>
-          <a:p>
-            <a:pPr marL="522900" lvl="1" indent="-342900">
-              <a:buFontTx/>
-              <a:buChar char="-"/>
-            </a:pPr>
-            <a:r>
-              <a:rPr lang="en-US" dirty="0"/>
-              <a:t>Point out the failure threshold</a:t>
-            </a:r>
-          </a:p>
-          <a:p>
-            <a:pPr marL="342900" indent="-342900">
-              <a:buFontTx/>
-              <a:buChar char="-"/>
-            </a:pPr>
-            <a:r>
-              <a:rPr lang="en-US" dirty="0"/>
-              <a:t>Create a 2</a:t>
-            </a:r>
-            <a:r>
-              <a:rPr lang="en-US" baseline="30000" dirty="0"/>
-              <a:t>nd</a:t>
-            </a:r>
-            <a:r>
-              <a:rPr lang="en-US" dirty="0"/>
-              <a:t> pod, this time with a web server: ~/</a:t>
-            </a:r>
-            <a:r>
-              <a:rPr lang="en-US" dirty="0" err="1"/>
-              <a:t>kubernetes</a:t>
-            </a:r>
-            <a:r>
-              <a:rPr lang="en-US" dirty="0"/>
-              <a:t>/demo/02_pod_http_liveness.yaml</a:t>
-            </a:r>
-          </a:p>
-          <a:p>
-            <a:pPr marL="522900" lvl="1" indent="-342900">
-              <a:buFontTx/>
-              <a:buChar char="-"/>
-            </a:pPr>
-            <a:r>
-              <a:rPr lang="en-US" dirty="0"/>
-              <a:t>Explain the http probe and how it should fill up the logs</a:t>
-            </a:r>
-          </a:p>
-          <a:p>
-            <a:pPr marL="522900" marR="0" lvl="1" indent="-342900" algn="l" defTabSz="1088776" rtl="0" eaLnBrk="1" fontAlgn="auto" latinLnBrk="0" hangingPunct="1">
-              <a:lnSpc>
-                <a:spcPct val="100000"/>
-              </a:lnSpc>
-              <a:spcBef>
-                <a:spcPts val="0"/>
-              </a:spcBef>
-              <a:spcAft>
-                <a:spcPts val="0"/>
-              </a:spcAft>
-              <a:buClr>
-                <a:schemeClr val="accent1"/>
-              </a:buClr>
-              <a:buSzPct val="100000"/>
-              <a:buFontTx/>
-              <a:buChar char="-"/>
-              <a:tabLst/>
-              <a:defRPr/>
-            </a:pPr>
-            <a:r>
-              <a:rPr lang="en-US" dirty="0"/>
-              <a:t>Show logs of the container (will be the access log) and discuss the effect of the liveness probe</a:t>
-            </a:r>
-          </a:p>
-          <a:p>
-            <a:pPr marL="342900" indent="-342900">
-              <a:buFontTx/>
-              <a:buChar char="-"/>
-            </a:pPr>
-            <a:r>
-              <a:rPr lang="en-US" dirty="0"/>
-              <a:t>Access </a:t>
-            </a:r>
-            <a:r>
-              <a:rPr lang="en-US" dirty="0" err="1"/>
-              <a:t>nginx</a:t>
-            </a:r>
-            <a:r>
-              <a:rPr lang="en-US" dirty="0"/>
-              <a:t>:</a:t>
-            </a:r>
-          </a:p>
-          <a:p>
-            <a:pPr marL="522864" lvl="1" indent="-342900">
-              <a:buFontTx/>
-              <a:buChar char="-"/>
-            </a:pPr>
-            <a:r>
-              <a:rPr lang="en-US" dirty="0"/>
-              <a:t>Run  </a:t>
-            </a:r>
-            <a:r>
-              <a:rPr lang="en-US" dirty="0" err="1"/>
-              <a:t>kubectl</a:t>
-            </a:r>
-            <a:r>
-              <a:rPr lang="en-US" dirty="0"/>
-              <a:t> port-forward pod/</a:t>
-            </a:r>
-            <a:r>
-              <a:rPr lang="en-US" dirty="0" err="1"/>
-              <a:t>nginx</a:t>
-            </a:r>
-            <a:r>
-              <a:rPr lang="en-US" dirty="0"/>
-              <a:t>-liveness-pod 8080:80</a:t>
-            </a:r>
-          </a:p>
-          <a:p>
-            <a:pPr marL="522864" lvl="1" indent="-342900">
-              <a:buFontTx/>
-              <a:buChar char="-"/>
-            </a:pPr>
-            <a:r>
-              <a:rPr lang="en-US" dirty="0"/>
-              <a:t>Open a browser and connect to 127.0.0.1:8080</a:t>
-            </a:r>
-          </a:p>
-          <a:p>
-            <a:pPr marL="522864" lvl="1" indent="-342900">
-              <a:buFontTx/>
-              <a:buChar char="-"/>
-            </a:pPr>
-            <a:r>
-              <a:rPr lang="en-US" dirty="0"/>
-              <a:t>Port-forward is a nice command to test access to something that you don’t want to expose (yet). However it is not recommended for any production like setup as the traffic is routed via the cluster’s API server</a:t>
-            </a:r>
-          </a:p>
-        </p:txBody>
-      </p:sp>
-      <p:sp>
-        <p:nvSpPr>
           <p:cNvPr id="4" name="Slide Number Placeholder 3"/>
           <p:cNvSpPr>
             <a:spLocks noGrp="1"/>
@@ -2015,10 +2257,48 @@
           </a:p>
         </p:txBody>
       </p:sp>
+      <p:sp>
+        <p:nvSpPr>
+          <p:cNvPr id="9" name="Slide Image Placeholder 8"/>
+          <p:cNvSpPr>
+            <a:spLocks noGrp="1" noRot="1" noChangeAspect="1"/>
+          </p:cNvSpPr>
+          <p:nvPr>
+            <p:ph type="sldImg"/>
+          </p:nvPr>
+        </p:nvSpPr>
+        <p:spPr>
+          <a:xfrm>
+            <a:off x="547688" y="612775"/>
+            <a:ext cx="5762625" cy="3241675"/>
+          </a:xfrm>
+        </p:spPr>
+      </p:sp>
+      <p:sp>
+        <p:nvSpPr>
+          <p:cNvPr id="10" name="Notes Placeholder 9"/>
+          <p:cNvSpPr>
+            <a:spLocks noGrp="1"/>
+          </p:cNvSpPr>
+          <p:nvPr>
+            <p:ph type="body" idx="1"/>
+          </p:nvPr>
+        </p:nvSpPr>
+        <p:spPr/>
+        <p:txBody>
+          <a:bodyPr>
+            <a:normAutofit/>
+          </a:bodyPr>
+          <a:lstStyle/>
+          <a:p>
+            <a:endParaRPr lang="en-US" dirty="0"/>
+          </a:p>
+        </p:txBody>
+      </p:sp>
     </p:spTree>
     <p:extLst>
       <p:ext uri="{BB962C8B-B14F-4D97-AF65-F5344CB8AC3E}">
-        <p14:creationId xmlns:p14="http://schemas.microsoft.com/office/powerpoint/2010/main" val="2327213927"/>
+        <p14:creationId xmlns:p14="http://schemas.microsoft.com/office/powerpoint/2010/main" val="3968705523"/>
       </p:ext>
     </p:extLst>
   </p:cSld>
@@ -9663,6 +9943,578 @@
 </file>
 
 <file path=ppt/slides/slide10.xml><?xml version="1.0" encoding="utf-8"?>
+<p:sld xmlns:a="http://schemas.openxmlformats.org/drawingml/2006/main" xmlns:r="http://schemas.openxmlformats.org/officeDocument/2006/relationships" xmlns:p="http://schemas.openxmlformats.org/presentationml/2006/main">
+  <p:cSld>
+    <p:spTree>
+      <p:nvGrpSpPr>
+        <p:cNvPr id="1" name=""/>
+        <p:cNvGrpSpPr/>
+        <p:nvPr/>
+      </p:nvGrpSpPr>
+      <p:grpSpPr>
+        <a:xfrm>
+          <a:off x="0" y="0"/>
+          <a:ext cx="0" cy="0"/>
+          <a:chOff x="0" y="0"/>
+          <a:chExt cx="0" cy="0"/>
+        </a:xfrm>
+      </p:grpSpPr>
+      <p:sp>
+        <p:nvSpPr>
+          <p:cNvPr id="3" name="Title 2"/>
+          <p:cNvSpPr>
+            <a:spLocks noGrp="1"/>
+          </p:cNvSpPr>
+          <p:nvPr>
+            <p:ph type="title"/>
+          </p:nvPr>
+        </p:nvSpPr>
+        <p:spPr/>
+        <p:txBody>
+          <a:bodyPr/>
+          <a:lstStyle/>
+          <a:p>
+            <a:r>
+              <a:rPr lang="en-US" dirty="0"/>
+              <a:t>Liveness &amp; Readiness Probes</a:t>
+            </a:r>
+          </a:p>
+        </p:txBody>
+      </p:sp>
+      <p:sp>
+        <p:nvSpPr>
+          <p:cNvPr id="4" name="Rectangle 3"/>
+          <p:cNvSpPr/>
+          <p:nvPr/>
+        </p:nvSpPr>
+        <p:spPr bwMode="gray">
+          <a:xfrm>
+            <a:off x="4886151" y="4398607"/>
+            <a:ext cx="2422872" cy="1775537"/>
+          </a:xfrm>
+          <a:prstGeom prst="rect">
+            <a:avLst/>
+          </a:prstGeom>
+          <a:ln>
+            <a:headEnd/>
+            <a:tailEnd/>
+          </a:ln>
+        </p:spPr>
+        <p:style>
+          <a:lnRef idx="2">
+            <a:schemeClr val="accent2">
+              <a:shade val="50000"/>
+            </a:schemeClr>
+          </a:lnRef>
+          <a:fillRef idx="1">
+            <a:schemeClr val="accent2"/>
+          </a:fillRef>
+          <a:effectRef idx="0">
+            <a:schemeClr val="accent2"/>
+          </a:effectRef>
+          <a:fontRef idx="minor">
+            <a:schemeClr val="lt1"/>
+          </a:fontRef>
+        </p:style>
+        <p:txBody>
+          <a:bodyPr lIns="90000" tIns="72000" rIns="90000" bIns="72000" rtlCol="0" anchor="ctr"/>
+          <a:lstStyle/>
+          <a:p>
+            <a:pPr marR="0" algn="ctr" defTabSz="914400" eaLnBrk="1" fontAlgn="base" latinLnBrk="0" hangingPunct="1">
+              <a:lnSpc>
+                <a:spcPct val="100000"/>
+              </a:lnSpc>
+              <a:spcBef>
+                <a:spcPct val="50000"/>
+              </a:spcBef>
+              <a:spcAft>
+                <a:spcPct val="0"/>
+              </a:spcAft>
+              <a:buClr>
+                <a:srgbClr val="F0AB00"/>
+              </a:buClr>
+              <a:buSzPct val="80000"/>
+              <a:tabLst/>
+            </a:pPr>
+            <a:r>
+              <a:rPr lang="de-DE" sz="2800" b="1" kern="0" noProof="0" dirty="0" err="1">
+                <a:ea typeface="Arial Unicode MS" pitchFamily="34" charset="-128"/>
+                <a:cs typeface="Arial Unicode MS" pitchFamily="34" charset="-128"/>
+              </a:rPr>
+              <a:t>nginx-pod</a:t>
+            </a:r>
+            <a:endParaRPr kumimoji="0" lang="de-DE" sz="2800" b="1" i="0" u="none" strike="noStrike" kern="0" cap="none" spc="0" normalizeH="0" baseline="0" noProof="0" dirty="0">
+              <a:ln>
+                <a:noFill/>
+              </a:ln>
+              <a:effectLst/>
+              <a:uLnTx/>
+              <a:uFillTx/>
+              <a:ea typeface="Arial Unicode MS" pitchFamily="34" charset="-128"/>
+              <a:cs typeface="Arial Unicode MS" pitchFamily="34" charset="-128"/>
+            </a:endParaRPr>
+          </a:p>
+        </p:txBody>
+      </p:sp>
+      <p:sp>
+        <p:nvSpPr>
+          <p:cNvPr id="5" name="Speech Bubble: Rectangle 4"/>
+          <p:cNvSpPr/>
+          <p:nvPr/>
+        </p:nvSpPr>
+        <p:spPr bwMode="gray">
+          <a:xfrm>
+            <a:off x="3867149" y="3333751"/>
+            <a:ext cx="1746423" cy="912456"/>
+          </a:xfrm>
+          <a:prstGeom prst="wedgeRectCallout">
+            <a:avLst>
+              <a:gd name="adj1" fmla="val 46475"/>
+              <a:gd name="adj2" fmla="val 98925"/>
+            </a:avLst>
+          </a:prstGeom>
+          <a:solidFill>
+            <a:schemeClr val="accent1"/>
+          </a:solidFill>
+          <a:ln w="6350" algn="ctr">
+            <a:noFill/>
+            <a:miter lim="800000"/>
+            <a:headEnd/>
+            <a:tailEnd/>
+          </a:ln>
+        </p:spPr>
+        <p:txBody>
+          <a:bodyPr lIns="90000" tIns="72000" rIns="90000" bIns="72000" rtlCol="0" anchor="ctr"/>
+          <a:lstStyle/>
+          <a:p>
+            <a:pPr marR="0" algn="ctr" defTabSz="914400" eaLnBrk="1" fontAlgn="base" latinLnBrk="0" hangingPunct="1">
+              <a:lnSpc>
+                <a:spcPct val="100000"/>
+              </a:lnSpc>
+              <a:spcBef>
+                <a:spcPct val="50000"/>
+              </a:spcBef>
+              <a:spcAft>
+                <a:spcPct val="0"/>
+              </a:spcAft>
+              <a:buClr>
+                <a:srgbClr val="F0AB00"/>
+              </a:buClr>
+              <a:buSzPct val="80000"/>
+              <a:tabLst/>
+            </a:pPr>
+            <a:r>
+              <a:rPr kumimoji="0" lang="en-US" sz="1800" b="0" i="0" u="none" strike="noStrike" kern="0" cap="none" spc="0" normalizeH="0" baseline="0" noProof="0" dirty="0">
+                <a:ln>
+                  <a:noFill/>
+                </a:ln>
+                <a:effectLst/>
+                <a:uLnTx/>
+                <a:uFillTx/>
+                <a:ea typeface="Arial Unicode MS" pitchFamily="34" charset="-128"/>
+                <a:cs typeface="Arial Unicode MS" pitchFamily="34" charset="-128"/>
+              </a:rPr>
+              <a:t>HTTP 200 ‘OK’</a:t>
+            </a:r>
+          </a:p>
+        </p:txBody>
+      </p:sp>
+      <p:sp>
+        <p:nvSpPr>
+          <p:cNvPr id="7" name="Speech Bubble: Rectangle 6"/>
+          <p:cNvSpPr/>
+          <p:nvPr/>
+        </p:nvSpPr>
+        <p:spPr bwMode="gray">
+          <a:xfrm>
+            <a:off x="6616786" y="3333751"/>
+            <a:ext cx="1746423" cy="912456"/>
+          </a:xfrm>
+          <a:prstGeom prst="wedgeRectCallout">
+            <a:avLst>
+              <a:gd name="adj1" fmla="val -48425"/>
+              <a:gd name="adj2" fmla="val 98925"/>
+            </a:avLst>
+          </a:prstGeom>
+          <a:solidFill>
+            <a:schemeClr val="accent1"/>
+          </a:solidFill>
+          <a:ln w="6350" algn="ctr">
+            <a:noFill/>
+            <a:miter lim="800000"/>
+            <a:headEnd/>
+            <a:tailEnd/>
+          </a:ln>
+        </p:spPr>
+        <p:txBody>
+          <a:bodyPr lIns="90000" tIns="72000" rIns="90000" bIns="72000" rtlCol="0" anchor="ctr"/>
+          <a:lstStyle/>
+          <a:p>
+            <a:pPr marR="0" algn="ctr" defTabSz="914400" eaLnBrk="1" fontAlgn="base" latinLnBrk="0" hangingPunct="1">
+              <a:lnSpc>
+                <a:spcPct val="100000"/>
+              </a:lnSpc>
+              <a:spcBef>
+                <a:spcPct val="50000"/>
+              </a:spcBef>
+              <a:spcAft>
+                <a:spcPct val="0"/>
+              </a:spcAft>
+              <a:buClr>
+                <a:srgbClr val="F0AB00"/>
+              </a:buClr>
+              <a:buSzPct val="80000"/>
+              <a:tabLst/>
+            </a:pPr>
+            <a:r>
+              <a:rPr lang="en-US" sz="1800" kern="0" dirty="0">
+                <a:ea typeface="Arial Unicode MS" pitchFamily="34" charset="-128"/>
+                <a:cs typeface="Arial Unicode MS" pitchFamily="34" charset="-128"/>
+              </a:rPr>
+              <a:t>i</a:t>
+            </a:r>
+            <a:r>
+              <a:rPr kumimoji="0" lang="en-US" sz="1800" b="0" i="0" u="none" strike="noStrike" kern="0" cap="none" spc="0" normalizeH="0" baseline="0" noProof="0" dirty="0">
+                <a:ln>
+                  <a:noFill/>
+                </a:ln>
+                <a:effectLst/>
+                <a:uLnTx/>
+                <a:uFillTx/>
+                <a:ea typeface="Arial Unicode MS" pitchFamily="34" charset="-128"/>
+                <a:cs typeface="Arial Unicode MS" pitchFamily="34" charset="-128"/>
+              </a:rPr>
+              <a:t>ndex.html</a:t>
+            </a:r>
+          </a:p>
+        </p:txBody>
+      </p:sp>
+      <p:sp>
+        <p:nvSpPr>
+          <p:cNvPr id="8" name="Rectangle 7"/>
+          <p:cNvSpPr/>
+          <p:nvPr/>
+        </p:nvSpPr>
+        <p:spPr bwMode="gray">
+          <a:xfrm>
+            <a:off x="739647" y="1215772"/>
+            <a:ext cx="3127502" cy="1775537"/>
+          </a:xfrm>
+          <a:prstGeom prst="rect">
+            <a:avLst/>
+          </a:prstGeom>
+          <a:ln>
+            <a:headEnd/>
+            <a:tailEnd/>
+          </a:ln>
+        </p:spPr>
+        <p:style>
+          <a:lnRef idx="2">
+            <a:schemeClr val="accent2">
+              <a:shade val="50000"/>
+            </a:schemeClr>
+          </a:lnRef>
+          <a:fillRef idx="1">
+            <a:schemeClr val="accent2"/>
+          </a:fillRef>
+          <a:effectRef idx="0">
+            <a:schemeClr val="accent2"/>
+          </a:effectRef>
+          <a:fontRef idx="minor">
+            <a:schemeClr val="lt1"/>
+          </a:fontRef>
+        </p:style>
+        <p:txBody>
+          <a:bodyPr lIns="90000" tIns="72000" rIns="90000" bIns="72000" rtlCol="0" anchor="ctr"/>
+          <a:lstStyle/>
+          <a:p>
+            <a:pPr marR="0" algn="ctr" defTabSz="914400" eaLnBrk="1" fontAlgn="base" latinLnBrk="0" hangingPunct="1">
+              <a:lnSpc>
+                <a:spcPct val="100000"/>
+              </a:lnSpc>
+              <a:spcBef>
+                <a:spcPct val="50000"/>
+              </a:spcBef>
+              <a:spcAft>
+                <a:spcPct val="0"/>
+              </a:spcAft>
+              <a:buClr>
+                <a:srgbClr val="F0AB00"/>
+              </a:buClr>
+              <a:buSzPct val="80000"/>
+              <a:tabLst/>
+            </a:pPr>
+            <a:r>
+              <a:rPr lang="en-US" sz="2800" b="1" kern="0" dirty="0">
+                <a:ea typeface="Arial Unicode MS" pitchFamily="34" charset="-128"/>
+                <a:cs typeface="Arial Unicode MS" pitchFamily="34" charset="-128"/>
+              </a:rPr>
+              <a:t>Respond with HTTP 200, if you are alive!</a:t>
+            </a:r>
+            <a:endParaRPr kumimoji="0" lang="en-US" sz="2800" b="1" i="0" u="none" strike="noStrike" kern="0" cap="none" spc="0" normalizeH="0" baseline="0" dirty="0">
+              <a:ln>
+                <a:noFill/>
+              </a:ln>
+              <a:effectLst/>
+              <a:uLnTx/>
+              <a:uFillTx/>
+              <a:ea typeface="Arial Unicode MS" pitchFamily="34" charset="-128"/>
+              <a:cs typeface="Arial Unicode MS" pitchFamily="34" charset="-128"/>
+            </a:endParaRPr>
+          </a:p>
+        </p:txBody>
+      </p:sp>
+      <p:sp>
+        <p:nvSpPr>
+          <p:cNvPr id="9" name="Rectangle 8"/>
+          <p:cNvSpPr/>
+          <p:nvPr/>
+        </p:nvSpPr>
+        <p:spPr bwMode="gray">
+          <a:xfrm>
+            <a:off x="8363209" y="1215771"/>
+            <a:ext cx="3127502" cy="1775537"/>
+          </a:xfrm>
+          <a:prstGeom prst="rect">
+            <a:avLst/>
+          </a:prstGeom>
+          <a:ln>
+            <a:headEnd/>
+            <a:tailEnd/>
+          </a:ln>
+        </p:spPr>
+        <p:style>
+          <a:lnRef idx="2">
+            <a:schemeClr val="accent2">
+              <a:shade val="50000"/>
+            </a:schemeClr>
+          </a:lnRef>
+          <a:fillRef idx="1">
+            <a:schemeClr val="accent2"/>
+          </a:fillRef>
+          <a:effectRef idx="0">
+            <a:schemeClr val="accent2"/>
+          </a:effectRef>
+          <a:fontRef idx="minor">
+            <a:schemeClr val="lt1"/>
+          </a:fontRef>
+        </p:style>
+        <p:txBody>
+          <a:bodyPr lIns="90000" tIns="72000" rIns="90000" bIns="72000" rtlCol="0" anchor="ctr"/>
+          <a:lstStyle/>
+          <a:p>
+            <a:pPr marR="0" algn="ctr" defTabSz="914400" eaLnBrk="1" fontAlgn="base" latinLnBrk="0" hangingPunct="1">
+              <a:lnSpc>
+                <a:spcPct val="100000"/>
+              </a:lnSpc>
+              <a:spcBef>
+                <a:spcPct val="50000"/>
+              </a:spcBef>
+              <a:spcAft>
+                <a:spcPct val="0"/>
+              </a:spcAft>
+              <a:buClr>
+                <a:srgbClr val="F0AB00"/>
+              </a:buClr>
+              <a:buSzPct val="80000"/>
+              <a:tabLst/>
+            </a:pPr>
+            <a:r>
+              <a:rPr lang="en-US" sz="2800" b="1" kern="0" dirty="0">
+                <a:ea typeface="Arial Unicode MS" pitchFamily="34" charset="-128"/>
+                <a:cs typeface="Arial Unicode MS" pitchFamily="34" charset="-128"/>
+              </a:rPr>
+              <a:t>Send back the index.html, if you are ready!</a:t>
+            </a:r>
+            <a:endParaRPr kumimoji="0" lang="en-US" sz="2800" b="1" i="0" u="none" strike="noStrike" kern="0" cap="none" spc="0" normalizeH="0" baseline="0" dirty="0">
+              <a:ln>
+                <a:noFill/>
+              </a:ln>
+              <a:effectLst/>
+              <a:uLnTx/>
+              <a:uFillTx/>
+              <a:ea typeface="Arial Unicode MS" pitchFamily="34" charset="-128"/>
+              <a:cs typeface="Arial Unicode MS" pitchFamily="34" charset="-128"/>
+            </a:endParaRPr>
+          </a:p>
+        </p:txBody>
+      </p:sp>
+      <p:cxnSp>
+        <p:nvCxnSpPr>
+          <p:cNvPr id="14" name="Connector: Elbow 13"/>
+          <p:cNvCxnSpPr>
+            <a:stCxn id="8" idx="2"/>
+            <a:endCxn id="4" idx="1"/>
+          </p:cNvCxnSpPr>
+          <p:nvPr/>
+        </p:nvCxnSpPr>
+        <p:spPr>
+          <a:xfrm rot="16200000" flipH="1">
+            <a:off x="2447241" y="2847465"/>
+            <a:ext cx="2295067" cy="2582753"/>
+          </a:xfrm>
+          <a:prstGeom prst="bentConnector2">
+            <a:avLst/>
+          </a:prstGeom>
+          <a:ln w="76200">
+            <a:solidFill>
+              <a:schemeClr val="tx2"/>
+            </a:solidFill>
+            <a:headEnd type="none" w="med" len="med"/>
+            <a:tailEnd type="triangle"/>
+          </a:ln>
+        </p:spPr>
+        <p:style>
+          <a:lnRef idx="1">
+            <a:schemeClr val="accent1"/>
+          </a:lnRef>
+          <a:fillRef idx="0">
+            <a:schemeClr val="accent1"/>
+          </a:fillRef>
+          <a:effectRef idx="0">
+            <a:schemeClr val="accent1"/>
+          </a:effectRef>
+          <a:fontRef idx="minor">
+            <a:schemeClr val="tx1"/>
+          </a:fontRef>
+        </p:style>
+      </p:cxnSp>
+      <p:cxnSp>
+        <p:nvCxnSpPr>
+          <p:cNvPr id="16" name="Connector: Elbow 15"/>
+          <p:cNvCxnSpPr>
+            <a:stCxn id="9" idx="2"/>
+            <a:endCxn id="4" idx="3"/>
+          </p:cNvCxnSpPr>
+          <p:nvPr/>
+        </p:nvCxnSpPr>
+        <p:spPr>
+          <a:xfrm rot="5400000">
+            <a:off x="7470458" y="2829874"/>
+            <a:ext cx="2295068" cy="2617937"/>
+          </a:xfrm>
+          <a:prstGeom prst="bentConnector2">
+            <a:avLst/>
+          </a:prstGeom>
+          <a:ln w="76200">
+            <a:solidFill>
+              <a:schemeClr val="tx2"/>
+            </a:solidFill>
+            <a:headEnd type="none" w="med" len="med"/>
+            <a:tailEnd type="triangle"/>
+          </a:ln>
+        </p:spPr>
+        <p:style>
+          <a:lnRef idx="1">
+            <a:schemeClr val="accent1"/>
+          </a:lnRef>
+          <a:fillRef idx="0">
+            <a:schemeClr val="accent1"/>
+          </a:fillRef>
+          <a:effectRef idx="0">
+            <a:schemeClr val="accent1"/>
+          </a:effectRef>
+          <a:fontRef idx="minor">
+            <a:schemeClr val="tx1"/>
+          </a:fontRef>
+        </p:style>
+      </p:cxnSp>
+    </p:spTree>
+    <p:extLst>
+      <p:ext uri="{BB962C8B-B14F-4D97-AF65-F5344CB8AC3E}">
+        <p14:creationId xmlns:p14="http://schemas.microsoft.com/office/powerpoint/2010/main" val="3826080233"/>
+      </p:ext>
+    </p:extLst>
+  </p:cSld>
+  <p:clrMapOvr>
+    <a:masterClrMapping/>
+  </p:clrMapOvr>
+</p:sld>
+</file>
+
+<file path=ppt/slides/slide11.xml><?xml version="1.0" encoding="utf-8"?>
+<p:sld xmlns:a="http://schemas.openxmlformats.org/drawingml/2006/main" xmlns:r="http://schemas.openxmlformats.org/officeDocument/2006/relationships" xmlns:p="http://schemas.openxmlformats.org/presentationml/2006/main">
+  <p:cSld>
+    <p:spTree>
+      <p:nvGrpSpPr>
+        <p:cNvPr id="1" name=""/>
+        <p:cNvGrpSpPr/>
+        <p:nvPr/>
+      </p:nvGrpSpPr>
+      <p:grpSpPr>
+        <a:xfrm>
+          <a:off x="0" y="0"/>
+          <a:ext cx="0" cy="0"/>
+          <a:chOff x="0" y="0"/>
+          <a:chExt cx="0" cy="0"/>
+        </a:xfrm>
+      </p:grpSpPr>
+      <p:sp>
+        <p:nvSpPr>
+          <p:cNvPr id="3" name="Title 2"/>
+          <p:cNvSpPr>
+            <a:spLocks noGrp="1"/>
+          </p:cNvSpPr>
+          <p:nvPr>
+            <p:ph type="title"/>
+          </p:nvPr>
+        </p:nvSpPr>
+        <p:spPr/>
+        <p:txBody>
+          <a:bodyPr/>
+          <a:lstStyle/>
+          <a:p>
+            <a:r>
+              <a:rPr lang="en-US" dirty="0"/>
+              <a:t>Demo</a:t>
+            </a:r>
+          </a:p>
+        </p:txBody>
+      </p:sp>
+      <p:pic>
+        <p:nvPicPr>
+          <p:cNvPr id="4" name="Picture 3">
+            <a:extLst>
+              <a:ext uri="{FF2B5EF4-FFF2-40B4-BE49-F238E27FC236}">
+                <a16:creationId xmlns:a16="http://schemas.microsoft.com/office/drawing/2014/main" id="{667C7630-D1BA-44ED-BD0C-E0F24DE56B91}"/>
+              </a:ext>
+            </a:extLst>
+          </p:cNvPr>
+          <p:cNvPicPr>
+            <a:picLocks noChangeAspect="1"/>
+          </p:cNvPicPr>
+          <p:nvPr/>
+        </p:nvPicPr>
+        <p:blipFill>
+          <a:blip r:embed="rId3"/>
+          <a:stretch>
+            <a:fillRect/>
+          </a:stretch>
+        </p:blipFill>
+        <p:spPr>
+          <a:xfrm>
+            <a:off x="3849419" y="1181180"/>
+            <a:ext cx="4495640" cy="4495640"/>
+          </a:xfrm>
+          <a:prstGeom prst="rect">
+            <a:avLst/>
+          </a:prstGeom>
+        </p:spPr>
+      </p:pic>
+    </p:spTree>
+    <p:extLst>
+      <p:ext uri="{BB962C8B-B14F-4D97-AF65-F5344CB8AC3E}">
+        <p14:creationId xmlns:p14="http://schemas.microsoft.com/office/powerpoint/2010/main" val="2631106931"/>
+      </p:ext>
+    </p:extLst>
+  </p:cSld>
+  <p:clrMapOvr>
+    <a:masterClrMapping/>
+  </p:clrMapOvr>
+</p:sld>
+</file>
+
+<file path=ppt/slides/slide12.xml><?xml version="1.0" encoding="utf-8"?>
 <p:sld xmlns:a="http://schemas.openxmlformats.org/drawingml/2006/main" xmlns:r="http://schemas.openxmlformats.org/officeDocument/2006/relationships" xmlns:p="http://schemas.openxmlformats.org/presentationml/2006/main">
   <p:cSld>
     <p:spTree>
@@ -10520,7 +11372,7 @@
 </p:sld>
 </file>
 
-<file path=ppt/slides/slide11.xml><?xml version="1.0" encoding="utf-8"?>
+<file path=ppt/slides/slide13.xml><?xml version="1.0" encoding="utf-8"?>
 <p:sld xmlns:a="http://schemas.openxmlformats.org/drawingml/2006/main" xmlns:r="http://schemas.openxmlformats.org/officeDocument/2006/relationships" xmlns:p="http://schemas.openxmlformats.org/presentationml/2006/main" show="0">
   <p:cSld>
     <p:spTree>
@@ -14387,6 +15239,627 @@
           <a:chExt cx="0" cy="0"/>
         </a:xfrm>
       </p:grpSpPr>
+      <p:sp>
+        <p:nvSpPr>
+          <p:cNvPr id="3" name="Title 2">
+            <a:extLst>
+              <a:ext uri="{FF2B5EF4-FFF2-40B4-BE49-F238E27FC236}">
+                <a16:creationId xmlns:a16="http://schemas.microsoft.com/office/drawing/2014/main" id="{2F5E5200-1EBB-48AC-9E3E-540D7D300B31}"/>
+              </a:ext>
+            </a:extLst>
+          </p:cNvPr>
+          <p:cNvSpPr>
+            <a:spLocks noGrp="1"/>
+          </p:cNvSpPr>
+          <p:nvPr>
+            <p:ph type="title"/>
+          </p:nvPr>
+        </p:nvSpPr>
+        <p:spPr/>
+        <p:txBody>
+          <a:bodyPr/>
+          <a:lstStyle/>
+          <a:p>
+            <a:r>
+              <a:rPr lang="en-US" dirty="0"/>
+              <a:t>API documentation – Pod structure</a:t>
+            </a:r>
+          </a:p>
+        </p:txBody>
+      </p:sp>
+      <p:sp>
+        <p:nvSpPr>
+          <p:cNvPr id="4" name="Rectangle 3">
+            <a:extLst>
+              <a:ext uri="{FF2B5EF4-FFF2-40B4-BE49-F238E27FC236}">
+                <a16:creationId xmlns:a16="http://schemas.microsoft.com/office/drawing/2014/main" id="{DCB60DFE-A47A-423D-B9E3-AF96A86F71E7}"/>
+              </a:ext>
+            </a:extLst>
+          </p:cNvPr>
+          <p:cNvSpPr/>
+          <p:nvPr/>
+        </p:nvSpPr>
+        <p:spPr>
+          <a:xfrm>
+            <a:off x="504001" y="1240262"/>
+            <a:ext cx="6014786" cy="400110"/>
+          </a:xfrm>
+          <a:prstGeom prst="rect">
+            <a:avLst/>
+          </a:prstGeom>
+        </p:spPr>
+        <p:txBody>
+          <a:bodyPr wrap="square">
+            <a:spAutoFit/>
+          </a:bodyPr>
+          <a:lstStyle/>
+          <a:p>
+            <a:r>
+              <a:rPr lang="en-US" sz="2000" dirty="0">
+                <a:hlinkClick r:id="rId3"/>
+              </a:rPr>
+              <a:t>https://kubernetes.io/docs/reference/#api-reference</a:t>
+            </a:r>
+            <a:endParaRPr lang="en-US" sz="2000" dirty="0"/>
+          </a:p>
+        </p:txBody>
+      </p:sp>
+      <p:pic>
+        <p:nvPicPr>
+          <p:cNvPr id="5" name="Picture 4">
+            <a:extLst>
+              <a:ext uri="{FF2B5EF4-FFF2-40B4-BE49-F238E27FC236}">
+                <a16:creationId xmlns:a16="http://schemas.microsoft.com/office/drawing/2014/main" id="{0DA3CA79-31C1-456A-8B01-BF80B3DD19A4}"/>
+              </a:ext>
+            </a:extLst>
+          </p:cNvPr>
+          <p:cNvPicPr>
+            <a:picLocks noChangeAspect="1"/>
+          </p:cNvPicPr>
+          <p:nvPr/>
+        </p:nvPicPr>
+        <p:blipFill>
+          <a:blip r:embed="rId4"/>
+          <a:stretch>
+            <a:fillRect/>
+          </a:stretch>
+        </p:blipFill>
+        <p:spPr>
+          <a:xfrm>
+            <a:off x="504001" y="1823734"/>
+            <a:ext cx="8708825" cy="4632354"/>
+          </a:xfrm>
+          <a:prstGeom prst="rect">
+            <a:avLst/>
+          </a:prstGeom>
+        </p:spPr>
+      </p:pic>
+    </p:spTree>
+    <p:extLst>
+      <p:ext uri="{BB962C8B-B14F-4D97-AF65-F5344CB8AC3E}">
+        <p14:creationId xmlns:p14="http://schemas.microsoft.com/office/powerpoint/2010/main" val="2822595700"/>
+      </p:ext>
+    </p:extLst>
+  </p:cSld>
+  <p:clrMapOvr>
+    <a:masterClrMapping/>
+  </p:clrMapOvr>
+</p:sld>
+</file>
+
+<file path=ppt/slides/slide8.xml><?xml version="1.0" encoding="utf-8"?>
+<p:sld xmlns:a="http://schemas.openxmlformats.org/drawingml/2006/main" xmlns:r="http://schemas.openxmlformats.org/officeDocument/2006/relationships" xmlns:p="http://schemas.openxmlformats.org/presentationml/2006/main">
+  <p:cSld>
+    <p:spTree>
+      <p:nvGrpSpPr>
+        <p:cNvPr id="1" name=""/>
+        <p:cNvGrpSpPr/>
+        <p:nvPr/>
+      </p:nvGrpSpPr>
+      <p:grpSpPr>
+        <a:xfrm>
+          <a:off x="0" y="0"/>
+          <a:ext cx="0" cy="0"/>
+          <a:chOff x="0" y="0"/>
+          <a:chExt cx="0" cy="0"/>
+        </a:xfrm>
+      </p:grpSpPr>
+      <p:sp>
+        <p:nvSpPr>
+          <p:cNvPr id="3" name="Title 2">
+            <a:extLst>
+              <a:ext uri="{FF2B5EF4-FFF2-40B4-BE49-F238E27FC236}">
+                <a16:creationId xmlns:a16="http://schemas.microsoft.com/office/drawing/2014/main" id="{80F2C493-42F3-4142-80BB-153E7286291F}"/>
+              </a:ext>
+            </a:extLst>
+          </p:cNvPr>
+          <p:cNvSpPr>
+            <a:spLocks noGrp="1"/>
+          </p:cNvSpPr>
+          <p:nvPr>
+            <p:ph type="title"/>
+          </p:nvPr>
+        </p:nvSpPr>
+        <p:spPr/>
+        <p:txBody>
+          <a:bodyPr/>
+          <a:lstStyle/>
+          <a:p>
+            <a:r>
+              <a:rPr lang="en-US" dirty="0" err="1"/>
+              <a:t>kubectl</a:t>
+            </a:r>
+            <a:r>
+              <a:rPr lang="en-US" dirty="0"/>
+              <a:t> explain pod</a:t>
+            </a:r>
+          </a:p>
+        </p:txBody>
+      </p:sp>
+      <p:sp>
+        <p:nvSpPr>
+          <p:cNvPr id="7" name="Rectangle 6">
+            <a:extLst>
+              <a:ext uri="{FF2B5EF4-FFF2-40B4-BE49-F238E27FC236}">
+                <a16:creationId xmlns:a16="http://schemas.microsoft.com/office/drawing/2014/main" id="{0337A0A3-E55E-4366-89D8-55CF7D014A21}"/>
+              </a:ext>
+            </a:extLst>
+          </p:cNvPr>
+          <p:cNvSpPr/>
+          <p:nvPr/>
+        </p:nvSpPr>
+        <p:spPr>
+          <a:xfrm>
+            <a:off x="504001" y="998984"/>
+            <a:ext cx="10675276" cy="5509200"/>
+          </a:xfrm>
+          <a:prstGeom prst="rect">
+            <a:avLst/>
+          </a:prstGeom>
+        </p:spPr>
+        <p:txBody>
+          <a:bodyPr wrap="square">
+            <a:spAutoFit/>
+          </a:bodyPr>
+          <a:lstStyle/>
+          <a:p>
+            <a:r>
+              <a:rPr lang="en-US" sz="1200" b="1" dirty="0">
+                <a:latin typeface="Courier New" panose="02070309020205020404" pitchFamily="49" charset="0"/>
+                <a:cs typeface="Courier New" panose="02070309020205020404" pitchFamily="49" charset="0"/>
+              </a:rPr>
+              <a:t>$: </a:t>
+            </a:r>
+            <a:r>
+              <a:rPr lang="en-US" sz="1200" b="1" dirty="0" err="1">
+                <a:latin typeface="Courier New" panose="02070309020205020404" pitchFamily="49" charset="0"/>
+                <a:cs typeface="Courier New" panose="02070309020205020404" pitchFamily="49" charset="0"/>
+              </a:rPr>
+              <a:t>kubectl</a:t>
+            </a:r>
+            <a:r>
+              <a:rPr lang="en-US" sz="1200" b="1" dirty="0">
+                <a:latin typeface="Courier New" panose="02070309020205020404" pitchFamily="49" charset="0"/>
+                <a:cs typeface="Courier New" panose="02070309020205020404" pitchFamily="49" charset="0"/>
+              </a:rPr>
+              <a:t> explain pods</a:t>
+            </a:r>
+          </a:p>
+          <a:p>
+            <a:r>
+              <a:rPr lang="en-US" sz="1100" b="1" dirty="0">
+                <a:latin typeface="Courier New" panose="02070309020205020404" pitchFamily="49" charset="0"/>
+                <a:cs typeface="Courier New" panose="02070309020205020404" pitchFamily="49" charset="0"/>
+              </a:rPr>
+              <a:t>KIND</a:t>
+            </a:r>
+            <a:r>
+              <a:rPr lang="en-US" sz="1100" dirty="0">
+                <a:latin typeface="Courier New" panose="02070309020205020404" pitchFamily="49" charset="0"/>
+                <a:cs typeface="Courier New" panose="02070309020205020404" pitchFamily="49" charset="0"/>
+              </a:rPr>
+              <a:t>:	Pod</a:t>
+            </a:r>
+          </a:p>
+          <a:p>
+            <a:r>
+              <a:rPr lang="en-US" sz="1100" b="1" dirty="0">
+                <a:latin typeface="Courier New" panose="02070309020205020404" pitchFamily="49" charset="0"/>
+                <a:cs typeface="Courier New" panose="02070309020205020404" pitchFamily="49" charset="0"/>
+              </a:rPr>
+              <a:t>VERSION</a:t>
+            </a:r>
+            <a:r>
+              <a:rPr lang="en-US" sz="1100" dirty="0">
+                <a:latin typeface="Courier New" panose="02070309020205020404" pitchFamily="49" charset="0"/>
+                <a:cs typeface="Courier New" panose="02070309020205020404" pitchFamily="49" charset="0"/>
+              </a:rPr>
+              <a:t>: 	v1</a:t>
+            </a:r>
+          </a:p>
+          <a:p>
+            <a:r>
+              <a:rPr lang="en-US" sz="1100" b="1" dirty="0">
+                <a:latin typeface="Courier New" panose="02070309020205020404" pitchFamily="49" charset="0"/>
+                <a:cs typeface="Courier New" panose="02070309020205020404" pitchFamily="49" charset="0"/>
+              </a:rPr>
+              <a:t>DESCRIPTION</a:t>
+            </a:r>
+            <a:r>
+              <a:rPr lang="en-US" sz="1100" dirty="0">
+                <a:latin typeface="Courier New" panose="02070309020205020404" pitchFamily="49" charset="0"/>
+                <a:cs typeface="Courier New" panose="02070309020205020404" pitchFamily="49" charset="0"/>
+              </a:rPr>
+              <a:t>:</a:t>
+            </a:r>
+          </a:p>
+          <a:p>
+            <a:r>
+              <a:rPr lang="en-US" sz="1100" dirty="0">
+                <a:latin typeface="Courier New" panose="02070309020205020404" pitchFamily="49" charset="0"/>
+                <a:cs typeface="Courier New" panose="02070309020205020404" pitchFamily="49" charset="0"/>
+              </a:rPr>
+              <a:t>     Pod is a collection of containers that can run on a host. This resource is</a:t>
+            </a:r>
+          </a:p>
+          <a:p>
+            <a:r>
+              <a:rPr lang="en-US" sz="1100" dirty="0">
+                <a:latin typeface="Courier New" panose="02070309020205020404" pitchFamily="49" charset="0"/>
+                <a:cs typeface="Courier New" panose="02070309020205020404" pitchFamily="49" charset="0"/>
+              </a:rPr>
+              <a:t>     created by clients and scheduled onto hosts.</a:t>
+            </a:r>
+          </a:p>
+          <a:p>
+            <a:endParaRPr lang="en-US" sz="1100" dirty="0">
+              <a:latin typeface="Courier New" panose="02070309020205020404" pitchFamily="49" charset="0"/>
+              <a:cs typeface="Courier New" panose="02070309020205020404" pitchFamily="49" charset="0"/>
+            </a:endParaRPr>
+          </a:p>
+          <a:p>
+            <a:r>
+              <a:rPr lang="en-US" sz="1100" b="1" dirty="0">
+                <a:latin typeface="Courier New" panose="02070309020205020404" pitchFamily="49" charset="0"/>
+                <a:cs typeface="Courier New" panose="02070309020205020404" pitchFamily="49" charset="0"/>
+              </a:rPr>
+              <a:t>FIELDS</a:t>
+            </a:r>
+            <a:r>
+              <a:rPr lang="en-US" sz="1100" dirty="0">
+                <a:latin typeface="Courier New" panose="02070309020205020404" pitchFamily="49" charset="0"/>
+                <a:cs typeface="Courier New" panose="02070309020205020404" pitchFamily="49" charset="0"/>
+              </a:rPr>
+              <a:t>:</a:t>
+            </a:r>
+          </a:p>
+          <a:p>
+            <a:r>
+              <a:rPr lang="en-US" sz="1100" dirty="0">
+                <a:latin typeface="Courier New" panose="02070309020205020404" pitchFamily="49" charset="0"/>
+                <a:cs typeface="Courier New" panose="02070309020205020404" pitchFamily="49" charset="0"/>
+              </a:rPr>
+              <a:t>   </a:t>
+            </a:r>
+            <a:r>
+              <a:rPr lang="en-US" sz="1100" b="1" dirty="0" err="1">
+                <a:latin typeface="Courier New" panose="02070309020205020404" pitchFamily="49" charset="0"/>
+                <a:cs typeface="Courier New" panose="02070309020205020404" pitchFamily="49" charset="0"/>
+              </a:rPr>
+              <a:t>apiVersion</a:t>
+            </a:r>
+            <a:r>
+              <a:rPr lang="en-US" sz="1100" b="1" dirty="0">
+                <a:latin typeface="Courier New" panose="02070309020205020404" pitchFamily="49" charset="0"/>
+                <a:cs typeface="Courier New" panose="02070309020205020404" pitchFamily="49" charset="0"/>
+              </a:rPr>
+              <a:t> </a:t>
+            </a:r>
+            <a:r>
+              <a:rPr lang="en-US" sz="1100" dirty="0">
+                <a:latin typeface="Courier New" panose="02070309020205020404" pitchFamily="49" charset="0"/>
+                <a:cs typeface="Courier New" panose="02070309020205020404" pitchFamily="49" charset="0"/>
+              </a:rPr>
+              <a:t>&lt;string&gt;</a:t>
+            </a:r>
+          </a:p>
+          <a:p>
+            <a:r>
+              <a:rPr lang="en-US" sz="1100" dirty="0">
+                <a:latin typeface="Courier New" panose="02070309020205020404" pitchFamily="49" charset="0"/>
+                <a:cs typeface="Courier New" panose="02070309020205020404" pitchFamily="49" charset="0"/>
+              </a:rPr>
+              <a:t>     </a:t>
+            </a:r>
+            <a:r>
+              <a:rPr lang="en-US" sz="1100" dirty="0" err="1">
+                <a:latin typeface="Courier New" panose="02070309020205020404" pitchFamily="49" charset="0"/>
+                <a:cs typeface="Courier New" panose="02070309020205020404" pitchFamily="49" charset="0"/>
+              </a:rPr>
+              <a:t>APIVersion</a:t>
+            </a:r>
+            <a:r>
+              <a:rPr lang="en-US" sz="1100" dirty="0">
+                <a:latin typeface="Courier New" panose="02070309020205020404" pitchFamily="49" charset="0"/>
+                <a:cs typeface="Courier New" panose="02070309020205020404" pitchFamily="49" charset="0"/>
+              </a:rPr>
+              <a:t> defines the versioned schema of this representation of an</a:t>
+            </a:r>
+          </a:p>
+          <a:p>
+            <a:r>
+              <a:rPr lang="en-US" sz="1100" dirty="0">
+                <a:latin typeface="Courier New" panose="02070309020205020404" pitchFamily="49" charset="0"/>
+                <a:cs typeface="Courier New" panose="02070309020205020404" pitchFamily="49" charset="0"/>
+              </a:rPr>
+              <a:t>     object. Servers should convert recognized schemas to the latest internal</a:t>
+            </a:r>
+          </a:p>
+          <a:p>
+            <a:r>
+              <a:rPr lang="en-US" sz="1100" dirty="0">
+                <a:latin typeface="Courier New" panose="02070309020205020404" pitchFamily="49" charset="0"/>
+                <a:cs typeface="Courier New" panose="02070309020205020404" pitchFamily="49" charset="0"/>
+              </a:rPr>
+              <a:t>     value, and may reject unrecognized values. More info:</a:t>
+            </a:r>
+          </a:p>
+          <a:p>
+            <a:r>
+              <a:rPr lang="en-US" sz="1100" dirty="0">
+                <a:latin typeface="Courier New" panose="02070309020205020404" pitchFamily="49" charset="0"/>
+                <a:cs typeface="Courier New" panose="02070309020205020404" pitchFamily="49" charset="0"/>
+              </a:rPr>
+              <a:t>     https://git.k8s.io/community/contributors/devel/api-conventions.md#resources</a:t>
+            </a:r>
+          </a:p>
+          <a:p>
+            <a:endParaRPr lang="en-US" sz="1100" dirty="0">
+              <a:latin typeface="Courier New" panose="02070309020205020404" pitchFamily="49" charset="0"/>
+              <a:cs typeface="Courier New" panose="02070309020205020404" pitchFamily="49" charset="0"/>
+            </a:endParaRPr>
+          </a:p>
+          <a:p>
+            <a:r>
+              <a:rPr lang="en-US" sz="1100" dirty="0">
+                <a:latin typeface="Courier New" panose="02070309020205020404" pitchFamily="49" charset="0"/>
+                <a:cs typeface="Courier New" panose="02070309020205020404" pitchFamily="49" charset="0"/>
+              </a:rPr>
+              <a:t>   </a:t>
+            </a:r>
+            <a:r>
+              <a:rPr lang="en-US" sz="1100" b="1" dirty="0">
+                <a:latin typeface="Courier New" panose="02070309020205020404" pitchFamily="49" charset="0"/>
+                <a:cs typeface="Courier New" panose="02070309020205020404" pitchFamily="49" charset="0"/>
+              </a:rPr>
+              <a:t>kind	</a:t>
+            </a:r>
+            <a:r>
+              <a:rPr lang="en-US" sz="1100" dirty="0">
+                <a:latin typeface="Courier New" panose="02070309020205020404" pitchFamily="49" charset="0"/>
+                <a:cs typeface="Courier New" panose="02070309020205020404" pitchFamily="49" charset="0"/>
+              </a:rPr>
+              <a:t>&lt;string&gt;</a:t>
+            </a:r>
+          </a:p>
+          <a:p>
+            <a:r>
+              <a:rPr lang="en-US" sz="1100" dirty="0">
+                <a:latin typeface="Courier New" panose="02070309020205020404" pitchFamily="49" charset="0"/>
+                <a:cs typeface="Courier New" panose="02070309020205020404" pitchFamily="49" charset="0"/>
+              </a:rPr>
+              <a:t>     Kind is a string value representing the REST resource this object</a:t>
+            </a:r>
+          </a:p>
+          <a:p>
+            <a:r>
+              <a:rPr lang="en-US" sz="1100" dirty="0">
+                <a:latin typeface="Courier New" panose="02070309020205020404" pitchFamily="49" charset="0"/>
+                <a:cs typeface="Courier New" panose="02070309020205020404" pitchFamily="49" charset="0"/>
+              </a:rPr>
+              <a:t>     represents. Servers may infer this from the endpoint the client submits</a:t>
+            </a:r>
+          </a:p>
+          <a:p>
+            <a:r>
+              <a:rPr lang="en-US" sz="1100" dirty="0">
+                <a:latin typeface="Courier New" panose="02070309020205020404" pitchFamily="49" charset="0"/>
+                <a:cs typeface="Courier New" panose="02070309020205020404" pitchFamily="49" charset="0"/>
+              </a:rPr>
+              <a:t>     requests to. Cannot be updated. In CamelCase. More info:</a:t>
+            </a:r>
+          </a:p>
+          <a:p>
+            <a:r>
+              <a:rPr lang="en-US" sz="1100" dirty="0">
+                <a:latin typeface="Courier New" panose="02070309020205020404" pitchFamily="49" charset="0"/>
+                <a:cs typeface="Courier New" panose="02070309020205020404" pitchFamily="49" charset="0"/>
+              </a:rPr>
+              <a:t>     https://git.k8s.io/community/contributors/devel/api-conventions.md#types-kinds</a:t>
+            </a:r>
+          </a:p>
+          <a:p>
+            <a:endParaRPr lang="en-US" sz="1100" dirty="0">
+              <a:latin typeface="Courier New" panose="02070309020205020404" pitchFamily="49" charset="0"/>
+              <a:cs typeface="Courier New" panose="02070309020205020404" pitchFamily="49" charset="0"/>
+            </a:endParaRPr>
+          </a:p>
+          <a:p>
+            <a:r>
+              <a:rPr lang="en-US" sz="1100" dirty="0">
+                <a:latin typeface="Courier New" panose="02070309020205020404" pitchFamily="49" charset="0"/>
+                <a:cs typeface="Courier New" panose="02070309020205020404" pitchFamily="49" charset="0"/>
+              </a:rPr>
+              <a:t>   </a:t>
+            </a:r>
+            <a:r>
+              <a:rPr lang="en-US" sz="1100" b="1" dirty="0">
+                <a:latin typeface="Courier New" panose="02070309020205020404" pitchFamily="49" charset="0"/>
+                <a:cs typeface="Courier New" panose="02070309020205020404" pitchFamily="49" charset="0"/>
+              </a:rPr>
+              <a:t>metadata	</a:t>
+            </a:r>
+            <a:r>
+              <a:rPr lang="en-US" sz="1100" dirty="0">
+                <a:latin typeface="Courier New" panose="02070309020205020404" pitchFamily="49" charset="0"/>
+                <a:cs typeface="Courier New" panose="02070309020205020404" pitchFamily="49" charset="0"/>
+              </a:rPr>
+              <a:t>&lt;Object&gt;</a:t>
+            </a:r>
+          </a:p>
+          <a:p>
+            <a:r>
+              <a:rPr lang="en-US" sz="1100" dirty="0">
+                <a:latin typeface="Courier New" panose="02070309020205020404" pitchFamily="49" charset="0"/>
+                <a:cs typeface="Courier New" panose="02070309020205020404" pitchFamily="49" charset="0"/>
+              </a:rPr>
+              <a:t>     Standard object's metadata. More info:</a:t>
+            </a:r>
+          </a:p>
+          <a:p>
+            <a:r>
+              <a:rPr lang="en-US" sz="1100" dirty="0">
+                <a:latin typeface="Courier New" panose="02070309020205020404" pitchFamily="49" charset="0"/>
+                <a:cs typeface="Courier New" panose="02070309020205020404" pitchFamily="49" charset="0"/>
+              </a:rPr>
+              <a:t>     https://git.k8s.io/community/contributors/devel/api-conventions.md#metadata</a:t>
+            </a:r>
+          </a:p>
+          <a:p>
+            <a:endParaRPr lang="en-US" sz="1100" dirty="0">
+              <a:latin typeface="Courier New" panose="02070309020205020404" pitchFamily="49" charset="0"/>
+              <a:cs typeface="Courier New" panose="02070309020205020404" pitchFamily="49" charset="0"/>
+            </a:endParaRPr>
+          </a:p>
+          <a:p>
+            <a:r>
+              <a:rPr lang="en-US" sz="1100" dirty="0">
+                <a:latin typeface="Courier New" panose="02070309020205020404" pitchFamily="49" charset="0"/>
+                <a:cs typeface="Courier New" panose="02070309020205020404" pitchFamily="49" charset="0"/>
+              </a:rPr>
+              <a:t>   </a:t>
+            </a:r>
+            <a:r>
+              <a:rPr lang="en-US" sz="1100" b="1" dirty="0">
+                <a:latin typeface="Courier New" panose="02070309020205020404" pitchFamily="49" charset="0"/>
+                <a:cs typeface="Courier New" panose="02070309020205020404" pitchFamily="49" charset="0"/>
+              </a:rPr>
+              <a:t>spec	</a:t>
+            </a:r>
+            <a:r>
+              <a:rPr lang="en-US" sz="1100" dirty="0">
+                <a:latin typeface="Courier New" panose="02070309020205020404" pitchFamily="49" charset="0"/>
+                <a:cs typeface="Courier New" panose="02070309020205020404" pitchFamily="49" charset="0"/>
+              </a:rPr>
+              <a:t>&lt;Object&gt;</a:t>
+            </a:r>
+          </a:p>
+          <a:p>
+            <a:r>
+              <a:rPr lang="en-US" sz="1100" dirty="0">
+                <a:latin typeface="Courier New" panose="02070309020205020404" pitchFamily="49" charset="0"/>
+                <a:cs typeface="Courier New" panose="02070309020205020404" pitchFamily="49" charset="0"/>
+              </a:rPr>
+              <a:t>     Specification of the desired behavior of the pod. More info:</a:t>
+            </a:r>
+          </a:p>
+          <a:p>
+            <a:r>
+              <a:rPr lang="en-US" sz="1100" dirty="0">
+                <a:latin typeface="Courier New" panose="02070309020205020404" pitchFamily="49" charset="0"/>
+                <a:cs typeface="Courier New" panose="02070309020205020404" pitchFamily="49" charset="0"/>
+              </a:rPr>
+              <a:t>     https://git.k8s.io/community/contributors/devel/api-conventions.md#spec-and-status</a:t>
+            </a:r>
+          </a:p>
+          <a:p>
+            <a:endParaRPr lang="en-US" sz="1100" dirty="0">
+              <a:latin typeface="Courier New" panose="02070309020205020404" pitchFamily="49" charset="0"/>
+              <a:cs typeface="Courier New" panose="02070309020205020404" pitchFamily="49" charset="0"/>
+            </a:endParaRPr>
+          </a:p>
+          <a:p>
+            <a:r>
+              <a:rPr lang="en-US" sz="1100" dirty="0">
+                <a:latin typeface="Courier New" panose="02070309020205020404" pitchFamily="49" charset="0"/>
+                <a:cs typeface="Courier New" panose="02070309020205020404" pitchFamily="49" charset="0"/>
+              </a:rPr>
+              <a:t>   </a:t>
+            </a:r>
+            <a:r>
+              <a:rPr lang="en-US" sz="1100" b="1" dirty="0">
+                <a:latin typeface="Courier New" panose="02070309020205020404" pitchFamily="49" charset="0"/>
+                <a:cs typeface="Courier New" panose="02070309020205020404" pitchFamily="49" charset="0"/>
+              </a:rPr>
+              <a:t>status	</a:t>
+            </a:r>
+            <a:r>
+              <a:rPr lang="en-US" sz="1100" dirty="0">
+                <a:latin typeface="Courier New" panose="02070309020205020404" pitchFamily="49" charset="0"/>
+                <a:cs typeface="Courier New" panose="02070309020205020404" pitchFamily="49" charset="0"/>
+              </a:rPr>
+              <a:t>&lt;Object&gt;</a:t>
+            </a:r>
+          </a:p>
+          <a:p>
+            <a:r>
+              <a:rPr lang="en-US" sz="1100" dirty="0">
+                <a:latin typeface="Courier New" panose="02070309020205020404" pitchFamily="49" charset="0"/>
+                <a:cs typeface="Courier New" panose="02070309020205020404" pitchFamily="49" charset="0"/>
+              </a:rPr>
+              <a:t>     Most recently observed status of the pod. This data may not be up to date.</a:t>
+            </a:r>
+          </a:p>
+          <a:p>
+            <a:r>
+              <a:rPr lang="en-US" sz="1100" dirty="0">
+                <a:latin typeface="Courier New" panose="02070309020205020404" pitchFamily="49" charset="0"/>
+                <a:cs typeface="Courier New" panose="02070309020205020404" pitchFamily="49" charset="0"/>
+              </a:rPr>
+              <a:t>     Populated by the system. Read-only. More info:</a:t>
+            </a:r>
+          </a:p>
+          <a:p>
+            <a:r>
+              <a:rPr lang="en-US" sz="1100" dirty="0">
+                <a:latin typeface="Courier New" panose="02070309020205020404" pitchFamily="49" charset="0"/>
+                <a:cs typeface="Courier New" panose="02070309020205020404" pitchFamily="49" charset="0"/>
+              </a:rPr>
+              <a:t>     https://git.k8s.io/community/contributors/devel/api-conventions.md#spec-and-status</a:t>
+            </a:r>
+          </a:p>
+        </p:txBody>
+      </p:sp>
+    </p:spTree>
+    <p:extLst>
+      <p:ext uri="{BB962C8B-B14F-4D97-AF65-F5344CB8AC3E}">
+        <p14:creationId xmlns:p14="http://schemas.microsoft.com/office/powerpoint/2010/main" val="3531034441"/>
+      </p:ext>
+    </p:extLst>
+  </p:cSld>
+  <p:clrMapOvr>
+    <a:masterClrMapping/>
+  </p:clrMapOvr>
+</p:sld>
+</file>
+
+<file path=ppt/slides/slide9.xml><?xml version="1.0" encoding="utf-8"?>
+<p:sld xmlns:a="http://schemas.openxmlformats.org/drawingml/2006/main" xmlns:r="http://schemas.openxmlformats.org/officeDocument/2006/relationships" xmlns:p="http://schemas.openxmlformats.org/presentationml/2006/main">
+  <p:cSld>
+    <p:spTree>
+      <p:nvGrpSpPr>
+        <p:cNvPr id="1" name=""/>
+        <p:cNvGrpSpPr/>
+        <p:nvPr/>
+      </p:nvGrpSpPr>
+      <p:grpSpPr>
+        <a:xfrm>
+          <a:off x="0" y="0"/>
+          <a:ext cx="0" cy="0"/>
+          <a:chOff x="0" y="0"/>
+          <a:chExt cx="0" cy="0"/>
+        </a:xfrm>
+      </p:grpSpPr>
       <p:pic>
         <p:nvPicPr>
           <p:cNvPr id="3" name="Picture 2"/>
@@ -14793,578 +16266,6 @@
     <p:extLst>
       <p:ext uri="{BB962C8B-B14F-4D97-AF65-F5344CB8AC3E}">
         <p14:creationId xmlns:p14="http://schemas.microsoft.com/office/powerpoint/2010/main" val="2266641752"/>
-      </p:ext>
-    </p:extLst>
-  </p:cSld>
-  <p:clrMapOvr>
-    <a:masterClrMapping/>
-  </p:clrMapOvr>
-</p:sld>
-</file>
-
-<file path=ppt/slides/slide8.xml><?xml version="1.0" encoding="utf-8"?>
-<p:sld xmlns:a="http://schemas.openxmlformats.org/drawingml/2006/main" xmlns:r="http://schemas.openxmlformats.org/officeDocument/2006/relationships" xmlns:p="http://schemas.openxmlformats.org/presentationml/2006/main">
-  <p:cSld>
-    <p:spTree>
-      <p:nvGrpSpPr>
-        <p:cNvPr id="1" name=""/>
-        <p:cNvGrpSpPr/>
-        <p:nvPr/>
-      </p:nvGrpSpPr>
-      <p:grpSpPr>
-        <a:xfrm>
-          <a:off x="0" y="0"/>
-          <a:ext cx="0" cy="0"/>
-          <a:chOff x="0" y="0"/>
-          <a:chExt cx="0" cy="0"/>
-        </a:xfrm>
-      </p:grpSpPr>
-      <p:sp>
-        <p:nvSpPr>
-          <p:cNvPr id="3" name="Title 2"/>
-          <p:cNvSpPr>
-            <a:spLocks noGrp="1"/>
-          </p:cNvSpPr>
-          <p:nvPr>
-            <p:ph type="title"/>
-          </p:nvPr>
-        </p:nvSpPr>
-        <p:spPr/>
-        <p:txBody>
-          <a:bodyPr/>
-          <a:lstStyle/>
-          <a:p>
-            <a:r>
-              <a:rPr lang="en-US" dirty="0"/>
-              <a:t>Liveness &amp; Readiness Probes</a:t>
-            </a:r>
-          </a:p>
-        </p:txBody>
-      </p:sp>
-      <p:sp>
-        <p:nvSpPr>
-          <p:cNvPr id="4" name="Rectangle 3"/>
-          <p:cNvSpPr/>
-          <p:nvPr/>
-        </p:nvSpPr>
-        <p:spPr bwMode="gray">
-          <a:xfrm>
-            <a:off x="4886151" y="4398607"/>
-            <a:ext cx="2422872" cy="1775537"/>
-          </a:xfrm>
-          <a:prstGeom prst="rect">
-            <a:avLst/>
-          </a:prstGeom>
-          <a:ln>
-            <a:headEnd/>
-            <a:tailEnd/>
-          </a:ln>
-        </p:spPr>
-        <p:style>
-          <a:lnRef idx="2">
-            <a:schemeClr val="accent2">
-              <a:shade val="50000"/>
-            </a:schemeClr>
-          </a:lnRef>
-          <a:fillRef idx="1">
-            <a:schemeClr val="accent2"/>
-          </a:fillRef>
-          <a:effectRef idx="0">
-            <a:schemeClr val="accent2"/>
-          </a:effectRef>
-          <a:fontRef idx="minor">
-            <a:schemeClr val="lt1"/>
-          </a:fontRef>
-        </p:style>
-        <p:txBody>
-          <a:bodyPr lIns="90000" tIns="72000" rIns="90000" bIns="72000" rtlCol="0" anchor="ctr"/>
-          <a:lstStyle/>
-          <a:p>
-            <a:pPr marR="0" algn="ctr" defTabSz="914400" eaLnBrk="1" fontAlgn="base" latinLnBrk="0" hangingPunct="1">
-              <a:lnSpc>
-                <a:spcPct val="100000"/>
-              </a:lnSpc>
-              <a:spcBef>
-                <a:spcPct val="50000"/>
-              </a:spcBef>
-              <a:spcAft>
-                <a:spcPct val="0"/>
-              </a:spcAft>
-              <a:buClr>
-                <a:srgbClr val="F0AB00"/>
-              </a:buClr>
-              <a:buSzPct val="80000"/>
-              <a:tabLst/>
-            </a:pPr>
-            <a:r>
-              <a:rPr lang="de-DE" sz="2800" b="1" kern="0" noProof="0" dirty="0" err="1">
-                <a:ea typeface="Arial Unicode MS" pitchFamily="34" charset="-128"/>
-                <a:cs typeface="Arial Unicode MS" pitchFamily="34" charset="-128"/>
-              </a:rPr>
-              <a:t>nginx-pod</a:t>
-            </a:r>
-            <a:endParaRPr kumimoji="0" lang="de-DE" sz="2800" b="1" i="0" u="none" strike="noStrike" kern="0" cap="none" spc="0" normalizeH="0" baseline="0" noProof="0" dirty="0">
-              <a:ln>
-                <a:noFill/>
-              </a:ln>
-              <a:effectLst/>
-              <a:uLnTx/>
-              <a:uFillTx/>
-              <a:ea typeface="Arial Unicode MS" pitchFamily="34" charset="-128"/>
-              <a:cs typeface="Arial Unicode MS" pitchFamily="34" charset="-128"/>
-            </a:endParaRPr>
-          </a:p>
-        </p:txBody>
-      </p:sp>
-      <p:sp>
-        <p:nvSpPr>
-          <p:cNvPr id="5" name="Speech Bubble: Rectangle 4"/>
-          <p:cNvSpPr/>
-          <p:nvPr/>
-        </p:nvSpPr>
-        <p:spPr bwMode="gray">
-          <a:xfrm>
-            <a:off x="3867149" y="3333751"/>
-            <a:ext cx="1746423" cy="912456"/>
-          </a:xfrm>
-          <a:prstGeom prst="wedgeRectCallout">
-            <a:avLst>
-              <a:gd name="adj1" fmla="val 46475"/>
-              <a:gd name="adj2" fmla="val 98925"/>
-            </a:avLst>
-          </a:prstGeom>
-          <a:solidFill>
-            <a:schemeClr val="accent1"/>
-          </a:solidFill>
-          <a:ln w="6350" algn="ctr">
-            <a:noFill/>
-            <a:miter lim="800000"/>
-            <a:headEnd/>
-            <a:tailEnd/>
-          </a:ln>
-        </p:spPr>
-        <p:txBody>
-          <a:bodyPr lIns="90000" tIns="72000" rIns="90000" bIns="72000" rtlCol="0" anchor="ctr"/>
-          <a:lstStyle/>
-          <a:p>
-            <a:pPr marR="0" algn="ctr" defTabSz="914400" eaLnBrk="1" fontAlgn="base" latinLnBrk="0" hangingPunct="1">
-              <a:lnSpc>
-                <a:spcPct val="100000"/>
-              </a:lnSpc>
-              <a:spcBef>
-                <a:spcPct val="50000"/>
-              </a:spcBef>
-              <a:spcAft>
-                <a:spcPct val="0"/>
-              </a:spcAft>
-              <a:buClr>
-                <a:srgbClr val="F0AB00"/>
-              </a:buClr>
-              <a:buSzPct val="80000"/>
-              <a:tabLst/>
-            </a:pPr>
-            <a:r>
-              <a:rPr kumimoji="0" lang="en-US" sz="1800" b="0" i="0" u="none" strike="noStrike" kern="0" cap="none" spc="0" normalizeH="0" baseline="0" noProof="0" dirty="0">
-                <a:ln>
-                  <a:noFill/>
-                </a:ln>
-                <a:effectLst/>
-                <a:uLnTx/>
-                <a:uFillTx/>
-                <a:ea typeface="Arial Unicode MS" pitchFamily="34" charset="-128"/>
-                <a:cs typeface="Arial Unicode MS" pitchFamily="34" charset="-128"/>
-              </a:rPr>
-              <a:t>HTTP 200 ‘OK’</a:t>
-            </a:r>
-          </a:p>
-        </p:txBody>
-      </p:sp>
-      <p:sp>
-        <p:nvSpPr>
-          <p:cNvPr id="7" name="Speech Bubble: Rectangle 6"/>
-          <p:cNvSpPr/>
-          <p:nvPr/>
-        </p:nvSpPr>
-        <p:spPr bwMode="gray">
-          <a:xfrm>
-            <a:off x="6616786" y="3333751"/>
-            <a:ext cx="1746423" cy="912456"/>
-          </a:xfrm>
-          <a:prstGeom prst="wedgeRectCallout">
-            <a:avLst>
-              <a:gd name="adj1" fmla="val -48425"/>
-              <a:gd name="adj2" fmla="val 98925"/>
-            </a:avLst>
-          </a:prstGeom>
-          <a:solidFill>
-            <a:schemeClr val="accent1"/>
-          </a:solidFill>
-          <a:ln w="6350" algn="ctr">
-            <a:noFill/>
-            <a:miter lim="800000"/>
-            <a:headEnd/>
-            <a:tailEnd/>
-          </a:ln>
-        </p:spPr>
-        <p:txBody>
-          <a:bodyPr lIns="90000" tIns="72000" rIns="90000" bIns="72000" rtlCol="0" anchor="ctr"/>
-          <a:lstStyle/>
-          <a:p>
-            <a:pPr marR="0" algn="ctr" defTabSz="914400" eaLnBrk="1" fontAlgn="base" latinLnBrk="0" hangingPunct="1">
-              <a:lnSpc>
-                <a:spcPct val="100000"/>
-              </a:lnSpc>
-              <a:spcBef>
-                <a:spcPct val="50000"/>
-              </a:spcBef>
-              <a:spcAft>
-                <a:spcPct val="0"/>
-              </a:spcAft>
-              <a:buClr>
-                <a:srgbClr val="F0AB00"/>
-              </a:buClr>
-              <a:buSzPct val="80000"/>
-              <a:tabLst/>
-            </a:pPr>
-            <a:r>
-              <a:rPr lang="en-US" sz="1800" kern="0" dirty="0">
-                <a:ea typeface="Arial Unicode MS" pitchFamily="34" charset="-128"/>
-                <a:cs typeface="Arial Unicode MS" pitchFamily="34" charset="-128"/>
-              </a:rPr>
-              <a:t>i</a:t>
-            </a:r>
-            <a:r>
-              <a:rPr kumimoji="0" lang="en-US" sz="1800" b="0" i="0" u="none" strike="noStrike" kern="0" cap="none" spc="0" normalizeH="0" baseline="0" noProof="0" dirty="0">
-                <a:ln>
-                  <a:noFill/>
-                </a:ln>
-                <a:effectLst/>
-                <a:uLnTx/>
-                <a:uFillTx/>
-                <a:ea typeface="Arial Unicode MS" pitchFamily="34" charset="-128"/>
-                <a:cs typeface="Arial Unicode MS" pitchFamily="34" charset="-128"/>
-              </a:rPr>
-              <a:t>ndex.html</a:t>
-            </a:r>
-          </a:p>
-        </p:txBody>
-      </p:sp>
-      <p:sp>
-        <p:nvSpPr>
-          <p:cNvPr id="8" name="Rectangle 7"/>
-          <p:cNvSpPr/>
-          <p:nvPr/>
-        </p:nvSpPr>
-        <p:spPr bwMode="gray">
-          <a:xfrm>
-            <a:off x="739647" y="1215772"/>
-            <a:ext cx="3127502" cy="1775537"/>
-          </a:xfrm>
-          <a:prstGeom prst="rect">
-            <a:avLst/>
-          </a:prstGeom>
-          <a:ln>
-            <a:headEnd/>
-            <a:tailEnd/>
-          </a:ln>
-        </p:spPr>
-        <p:style>
-          <a:lnRef idx="2">
-            <a:schemeClr val="accent2">
-              <a:shade val="50000"/>
-            </a:schemeClr>
-          </a:lnRef>
-          <a:fillRef idx="1">
-            <a:schemeClr val="accent2"/>
-          </a:fillRef>
-          <a:effectRef idx="0">
-            <a:schemeClr val="accent2"/>
-          </a:effectRef>
-          <a:fontRef idx="minor">
-            <a:schemeClr val="lt1"/>
-          </a:fontRef>
-        </p:style>
-        <p:txBody>
-          <a:bodyPr lIns="90000" tIns="72000" rIns="90000" bIns="72000" rtlCol="0" anchor="ctr"/>
-          <a:lstStyle/>
-          <a:p>
-            <a:pPr marR="0" algn="ctr" defTabSz="914400" eaLnBrk="1" fontAlgn="base" latinLnBrk="0" hangingPunct="1">
-              <a:lnSpc>
-                <a:spcPct val="100000"/>
-              </a:lnSpc>
-              <a:spcBef>
-                <a:spcPct val="50000"/>
-              </a:spcBef>
-              <a:spcAft>
-                <a:spcPct val="0"/>
-              </a:spcAft>
-              <a:buClr>
-                <a:srgbClr val="F0AB00"/>
-              </a:buClr>
-              <a:buSzPct val="80000"/>
-              <a:tabLst/>
-            </a:pPr>
-            <a:r>
-              <a:rPr lang="en-US" sz="2800" b="1" kern="0" dirty="0">
-                <a:ea typeface="Arial Unicode MS" pitchFamily="34" charset="-128"/>
-                <a:cs typeface="Arial Unicode MS" pitchFamily="34" charset="-128"/>
-              </a:rPr>
-              <a:t>Respond with HTTP 200, if you are alive!</a:t>
-            </a:r>
-            <a:endParaRPr kumimoji="0" lang="en-US" sz="2800" b="1" i="0" u="none" strike="noStrike" kern="0" cap="none" spc="0" normalizeH="0" baseline="0" dirty="0">
-              <a:ln>
-                <a:noFill/>
-              </a:ln>
-              <a:effectLst/>
-              <a:uLnTx/>
-              <a:uFillTx/>
-              <a:ea typeface="Arial Unicode MS" pitchFamily="34" charset="-128"/>
-              <a:cs typeface="Arial Unicode MS" pitchFamily="34" charset="-128"/>
-            </a:endParaRPr>
-          </a:p>
-        </p:txBody>
-      </p:sp>
-      <p:sp>
-        <p:nvSpPr>
-          <p:cNvPr id="9" name="Rectangle 8"/>
-          <p:cNvSpPr/>
-          <p:nvPr/>
-        </p:nvSpPr>
-        <p:spPr bwMode="gray">
-          <a:xfrm>
-            <a:off x="8363209" y="1215771"/>
-            <a:ext cx="3127502" cy="1775537"/>
-          </a:xfrm>
-          <a:prstGeom prst="rect">
-            <a:avLst/>
-          </a:prstGeom>
-          <a:ln>
-            <a:headEnd/>
-            <a:tailEnd/>
-          </a:ln>
-        </p:spPr>
-        <p:style>
-          <a:lnRef idx="2">
-            <a:schemeClr val="accent2">
-              <a:shade val="50000"/>
-            </a:schemeClr>
-          </a:lnRef>
-          <a:fillRef idx="1">
-            <a:schemeClr val="accent2"/>
-          </a:fillRef>
-          <a:effectRef idx="0">
-            <a:schemeClr val="accent2"/>
-          </a:effectRef>
-          <a:fontRef idx="minor">
-            <a:schemeClr val="lt1"/>
-          </a:fontRef>
-        </p:style>
-        <p:txBody>
-          <a:bodyPr lIns="90000" tIns="72000" rIns="90000" bIns="72000" rtlCol="0" anchor="ctr"/>
-          <a:lstStyle/>
-          <a:p>
-            <a:pPr marR="0" algn="ctr" defTabSz="914400" eaLnBrk="1" fontAlgn="base" latinLnBrk="0" hangingPunct="1">
-              <a:lnSpc>
-                <a:spcPct val="100000"/>
-              </a:lnSpc>
-              <a:spcBef>
-                <a:spcPct val="50000"/>
-              </a:spcBef>
-              <a:spcAft>
-                <a:spcPct val="0"/>
-              </a:spcAft>
-              <a:buClr>
-                <a:srgbClr val="F0AB00"/>
-              </a:buClr>
-              <a:buSzPct val="80000"/>
-              <a:tabLst/>
-            </a:pPr>
-            <a:r>
-              <a:rPr lang="en-US" sz="2800" b="1" kern="0" dirty="0">
-                <a:ea typeface="Arial Unicode MS" pitchFamily="34" charset="-128"/>
-                <a:cs typeface="Arial Unicode MS" pitchFamily="34" charset="-128"/>
-              </a:rPr>
-              <a:t>Send back the index.html, if you are ready!</a:t>
-            </a:r>
-            <a:endParaRPr kumimoji="0" lang="en-US" sz="2800" b="1" i="0" u="none" strike="noStrike" kern="0" cap="none" spc="0" normalizeH="0" baseline="0" dirty="0">
-              <a:ln>
-                <a:noFill/>
-              </a:ln>
-              <a:effectLst/>
-              <a:uLnTx/>
-              <a:uFillTx/>
-              <a:ea typeface="Arial Unicode MS" pitchFamily="34" charset="-128"/>
-              <a:cs typeface="Arial Unicode MS" pitchFamily="34" charset="-128"/>
-            </a:endParaRPr>
-          </a:p>
-        </p:txBody>
-      </p:sp>
-      <p:cxnSp>
-        <p:nvCxnSpPr>
-          <p:cNvPr id="14" name="Connector: Elbow 13"/>
-          <p:cNvCxnSpPr>
-            <a:stCxn id="8" idx="2"/>
-            <a:endCxn id="4" idx="1"/>
-          </p:cNvCxnSpPr>
-          <p:nvPr/>
-        </p:nvCxnSpPr>
-        <p:spPr>
-          <a:xfrm rot="16200000" flipH="1">
-            <a:off x="2447241" y="2847465"/>
-            <a:ext cx="2295067" cy="2582753"/>
-          </a:xfrm>
-          <a:prstGeom prst="bentConnector2">
-            <a:avLst/>
-          </a:prstGeom>
-          <a:ln w="76200">
-            <a:solidFill>
-              <a:schemeClr val="tx2"/>
-            </a:solidFill>
-            <a:headEnd type="none" w="med" len="med"/>
-            <a:tailEnd type="triangle"/>
-          </a:ln>
-        </p:spPr>
-        <p:style>
-          <a:lnRef idx="1">
-            <a:schemeClr val="accent1"/>
-          </a:lnRef>
-          <a:fillRef idx="0">
-            <a:schemeClr val="accent1"/>
-          </a:fillRef>
-          <a:effectRef idx="0">
-            <a:schemeClr val="accent1"/>
-          </a:effectRef>
-          <a:fontRef idx="minor">
-            <a:schemeClr val="tx1"/>
-          </a:fontRef>
-        </p:style>
-      </p:cxnSp>
-      <p:cxnSp>
-        <p:nvCxnSpPr>
-          <p:cNvPr id="16" name="Connector: Elbow 15"/>
-          <p:cNvCxnSpPr>
-            <a:stCxn id="9" idx="2"/>
-            <a:endCxn id="4" idx="3"/>
-          </p:cNvCxnSpPr>
-          <p:nvPr/>
-        </p:nvCxnSpPr>
-        <p:spPr>
-          <a:xfrm rot="5400000">
-            <a:off x="7470458" y="2829874"/>
-            <a:ext cx="2295068" cy="2617937"/>
-          </a:xfrm>
-          <a:prstGeom prst="bentConnector2">
-            <a:avLst/>
-          </a:prstGeom>
-          <a:ln w="76200">
-            <a:solidFill>
-              <a:schemeClr val="tx2"/>
-            </a:solidFill>
-            <a:headEnd type="none" w="med" len="med"/>
-            <a:tailEnd type="triangle"/>
-          </a:ln>
-        </p:spPr>
-        <p:style>
-          <a:lnRef idx="1">
-            <a:schemeClr val="accent1"/>
-          </a:lnRef>
-          <a:fillRef idx="0">
-            <a:schemeClr val="accent1"/>
-          </a:fillRef>
-          <a:effectRef idx="0">
-            <a:schemeClr val="accent1"/>
-          </a:effectRef>
-          <a:fontRef idx="minor">
-            <a:schemeClr val="tx1"/>
-          </a:fontRef>
-        </p:style>
-      </p:cxnSp>
-    </p:spTree>
-    <p:extLst>
-      <p:ext uri="{BB962C8B-B14F-4D97-AF65-F5344CB8AC3E}">
-        <p14:creationId xmlns:p14="http://schemas.microsoft.com/office/powerpoint/2010/main" val="3826080233"/>
-      </p:ext>
-    </p:extLst>
-  </p:cSld>
-  <p:clrMapOvr>
-    <a:masterClrMapping/>
-  </p:clrMapOvr>
-</p:sld>
-</file>
-
-<file path=ppt/slides/slide9.xml><?xml version="1.0" encoding="utf-8"?>
-<p:sld xmlns:a="http://schemas.openxmlformats.org/drawingml/2006/main" xmlns:r="http://schemas.openxmlformats.org/officeDocument/2006/relationships" xmlns:p="http://schemas.openxmlformats.org/presentationml/2006/main">
-  <p:cSld>
-    <p:spTree>
-      <p:nvGrpSpPr>
-        <p:cNvPr id="1" name=""/>
-        <p:cNvGrpSpPr/>
-        <p:nvPr/>
-      </p:nvGrpSpPr>
-      <p:grpSpPr>
-        <a:xfrm>
-          <a:off x="0" y="0"/>
-          <a:ext cx="0" cy="0"/>
-          <a:chOff x="0" y="0"/>
-          <a:chExt cx="0" cy="0"/>
-        </a:xfrm>
-      </p:grpSpPr>
-      <p:sp>
-        <p:nvSpPr>
-          <p:cNvPr id="3" name="Title 2"/>
-          <p:cNvSpPr>
-            <a:spLocks noGrp="1"/>
-          </p:cNvSpPr>
-          <p:nvPr>
-            <p:ph type="title"/>
-          </p:nvPr>
-        </p:nvSpPr>
-        <p:spPr/>
-        <p:txBody>
-          <a:bodyPr/>
-          <a:lstStyle/>
-          <a:p>
-            <a:r>
-              <a:rPr lang="en-US" dirty="0"/>
-              <a:t>Demo</a:t>
-            </a:r>
-          </a:p>
-        </p:txBody>
-      </p:sp>
-      <p:pic>
-        <p:nvPicPr>
-          <p:cNvPr id="4" name="Picture 3">
-            <a:extLst>
-              <a:ext uri="{FF2B5EF4-FFF2-40B4-BE49-F238E27FC236}">
-                <a16:creationId xmlns:a16="http://schemas.microsoft.com/office/drawing/2014/main" id="{667C7630-D1BA-44ED-BD0C-E0F24DE56B91}"/>
-              </a:ext>
-            </a:extLst>
-          </p:cNvPr>
-          <p:cNvPicPr>
-            <a:picLocks noChangeAspect="1"/>
-          </p:cNvPicPr>
-          <p:nvPr/>
-        </p:nvPicPr>
-        <p:blipFill>
-          <a:blip r:embed="rId3"/>
-          <a:stretch>
-            <a:fillRect/>
-          </a:stretch>
-        </p:blipFill>
-        <p:spPr>
-          <a:xfrm>
-            <a:off x="3849419" y="1181180"/>
-            <a:ext cx="4495640" cy="4495640"/>
-          </a:xfrm>
-          <a:prstGeom prst="rect">
-            <a:avLst/>
-          </a:prstGeom>
-        </p:spPr>
-      </p:pic>
-    </p:spTree>
-    <p:extLst>
-      <p:ext uri="{BB962C8B-B14F-4D97-AF65-F5344CB8AC3E}">
-        <p14:creationId xmlns:p14="http://schemas.microsoft.com/office/powerpoint/2010/main" val="2631106931"/>
       </p:ext>
     </p:extLst>
   </p:cSld>

</xml_diff>

<commit_message>
updated demo description with --dry-run
</commit_message>
<xml_diff>
--- a/kubernetes/02_pods.pptx
+++ b/kubernetes/02_pods.pptx
@@ -1106,6 +1106,21 @@
             </a:pPr>
             <a:r>
               <a:rPr lang="en-US" dirty="0"/>
+              <a:t>When creating pods, demo the --</a:t>
+            </a:r>
+            <a:r>
+              <a:rPr lang="en-US"/>
+              <a:t>dry-run flag</a:t>
+            </a:r>
+            <a:endParaRPr lang="en-US" dirty="0"/>
+          </a:p>
+          <a:p>
+            <a:pPr marL="342900" indent="-342900">
+              <a:buFontTx/>
+              <a:buChar char="-"/>
+            </a:pPr>
+            <a:r>
+              <a:rPr lang="en-US" dirty="0"/>
               <a:t>Create a pod: ~/</a:t>
             </a:r>
             <a:r>
@@ -1114,7 +1129,7 @@
             </a:r>
             <a:r>
               <a:rPr lang="en-US" dirty="0"/>
-              <a:t>/demo/02_pod_exec_liveness.yaml</a:t>
+              <a:t>/demo/02b_pod_exec_liveness.yaml</a:t>
             </a:r>
           </a:p>
           <a:p>

</xml_diff>

<commit_message>
pod picture now includes docker containers
</commit_message>
<xml_diff>
--- a/kubernetes/02_pods.pptx
+++ b/kubernetes/02_pods.pptx
@@ -14570,6 +14570,36 @@
           <a:chExt cx="0" cy="0"/>
         </a:xfrm>
       </p:grpSpPr>
+      <p:pic>
+        <p:nvPicPr>
+          <p:cNvPr id="2" name="Picture 1">
+            <a:extLst>
+              <a:ext uri="{FF2B5EF4-FFF2-40B4-BE49-F238E27FC236}">
+                <a16:creationId xmlns:a16="http://schemas.microsoft.com/office/drawing/2014/main" id="{36472E94-D447-4365-B71E-B873688E005C}"/>
+              </a:ext>
+            </a:extLst>
+          </p:cNvPr>
+          <p:cNvPicPr>
+            <a:picLocks noChangeAspect="1"/>
+          </p:cNvPicPr>
+          <p:nvPr/>
+        </p:nvPicPr>
+        <p:blipFill>
+          <a:blip r:embed="rId3"/>
+          <a:stretch>
+            <a:fillRect/>
+          </a:stretch>
+        </p:blipFill>
+        <p:spPr>
+          <a:xfrm>
+            <a:off x="564294" y="1842476"/>
+            <a:ext cx="5532945" cy="3511527"/>
+          </a:xfrm>
+          <a:prstGeom prst="rect">
+            <a:avLst/>
+          </a:prstGeom>
+        </p:spPr>
+      </p:pic>
       <p:sp>
         <p:nvSpPr>
           <p:cNvPr id="8" name="Title 7"/>
@@ -14592,47 +14622,6 @@
           </a:p>
         </p:txBody>
       </p:sp>
-      <p:pic>
-        <p:nvPicPr>
-          <p:cNvPr id="1030" name="Picture 6" descr="Related image"/>
-          <p:cNvPicPr>
-            <a:picLocks noChangeAspect="1" noChangeArrowheads="1"/>
-          </p:cNvPicPr>
-          <p:nvPr/>
-        </p:nvPicPr>
-        <p:blipFill>
-          <a:blip r:embed="rId3">
-            <a:extLst>
-              <a:ext uri="{28A0092B-C50C-407E-A947-70E740481C1C}">
-                <a14:useLocalDpi xmlns:a14="http://schemas.microsoft.com/office/drawing/2010/main" val="0"/>
-              </a:ext>
-            </a:extLst>
-          </a:blip>
-          <a:srcRect/>
-          <a:stretch>
-            <a:fillRect/>
-          </a:stretch>
-        </p:blipFill>
-        <p:spPr bwMode="auto">
-          <a:xfrm>
-            <a:off x="564294" y="1832526"/>
-            <a:ext cx="5532945" cy="3521477"/>
-          </a:xfrm>
-          <a:prstGeom prst="rect">
-            <a:avLst/>
-          </a:prstGeom>
-          <a:noFill/>
-          <a:extLst>
-            <a:ext uri="{909E8E84-426E-40DD-AFC4-6F175D3DCCD1}">
-              <a14:hiddenFill xmlns:a14="http://schemas.microsoft.com/office/drawing/2010/main">
-                <a:solidFill>
-                  <a:srgbClr val="FFFFFF"/>
-                </a:solidFill>
-              </a14:hiddenFill>
-            </a:ext>
-          </a:extLst>
-        </p:spPr>
-      </p:pic>
       <p:sp>
         <p:nvSpPr>
           <p:cNvPr id="12" name="Text Placeholder 2"/>
@@ -14893,7 +14882,7 @@
                             </p:stCondLst>
                             <p:childTnLst>
                               <p:par>
-                                <p:cTn id="5" presetID="1" presetClass="entr" presetSubtype="0" fill="hold" nodeType="clickEffect">
+                                <p:cTn id="5" presetID="1" presetClass="entr" presetSubtype="0" fill="hold" grpId="0" nodeType="clickEffect">
                                   <p:stCondLst>
                                     <p:cond delay="0"/>
                                   </p:stCondLst>
@@ -14901,51 +14890,6 @@
                                     <p:set>
                                       <p:cBhvr>
                                         <p:cTn id="6" dur="1" fill="hold">
-                                          <p:stCondLst>
-                                            <p:cond delay="0"/>
-                                          </p:stCondLst>
-                                        </p:cTn>
-                                        <p:tgtEl>
-                                          <p:spTgt spid="1030"/>
-                                        </p:tgtEl>
-                                        <p:attrNameLst>
-                                          <p:attrName>style.visibility</p:attrName>
-                                        </p:attrNameLst>
-                                      </p:cBhvr>
-                                      <p:to>
-                                        <p:strVal val="visible"/>
-                                      </p:to>
-                                    </p:set>
-                                  </p:childTnLst>
-                                </p:cTn>
-                              </p:par>
-                            </p:childTnLst>
-                          </p:cTn>
-                        </p:par>
-                      </p:childTnLst>
-                    </p:cTn>
-                  </p:par>
-                  <p:par>
-                    <p:cTn id="7" fill="hold">
-                      <p:stCondLst>
-                        <p:cond delay="indefinite"/>
-                      </p:stCondLst>
-                      <p:childTnLst>
-                        <p:par>
-                          <p:cTn id="8" fill="hold">
-                            <p:stCondLst>
-                              <p:cond delay="0"/>
-                            </p:stCondLst>
-                            <p:childTnLst>
-                              <p:par>
-                                <p:cTn id="9" presetID="1" presetClass="entr" presetSubtype="0" fill="hold" grpId="0" nodeType="clickEffect">
-                                  <p:stCondLst>
-                                    <p:cond delay="0"/>
-                                  </p:stCondLst>
-                                  <p:childTnLst>
-                                    <p:set>
-                                      <p:cBhvr>
-                                        <p:cTn id="10" dur="1" fill="hold">
                                           <p:stCondLst>
                                             <p:cond delay="0"/>
                                           </p:stCondLst>

</xml_diff>